<commit_message>
Tenth commit: ALL DONE
</commit_message>
<xml_diff>
--- a/Peresentation.pptx
+++ b/Peresentation.pptx
@@ -18,9 +18,12 @@
     <p:sldId id="266" r:id="rId12"/>
     <p:sldId id="267" r:id="rId13"/>
     <p:sldId id="268" r:id="rId14"/>
-    <p:sldId id="269" r:id="rId15"/>
-    <p:sldId id="270" r:id="rId16"/>
-    <p:sldId id="271" r:id="rId17"/>
+    <p:sldId id="272" r:id="rId15"/>
+    <p:sldId id="273" r:id="rId16"/>
+    <p:sldId id="274" r:id="rId17"/>
+    <p:sldId id="269" r:id="rId18"/>
+    <p:sldId id="270" r:id="rId19"/>
+    <p:sldId id="271" r:id="rId20"/>
   </p:sldIdLst>
   <p:sldSz cx="12192000" cy="6858000"/>
   <p:notesSz cx="6858000" cy="9144000"/>
@@ -119,6 +122,11 @@
       </a:defRPr>
     </a:lvl9pPr>
   </p:defaultTextStyle>
+  <p:extLst>
+    <p:ext uri="{EFAFB233-063F-42B5-8137-9DF3F51BA10A}">
+      <p15:sldGuideLst xmlns:p15="http://schemas.microsoft.com/office/powerpoint/2012/main"/>
+    </p:ext>
+  </p:extLst>
 </p:presentation>
 </file>
 
@@ -158,8 +166,8 @@
       <emma:emma xmlns:emma="http://www.w3.org/2003/04/emma" version="1.0">
         <emma:interpretation id="{3B3FBD64-4803-4BDA-B59A-302609A77F91}" emma:medium="tactile" emma:mode="ink">
           <msink:context xmlns:msink="http://schemas.microsoft.com/ink/2010/main" type="inkDrawing" rotatedBoundingBox="12373,8117 22014,8204 21983,11647 12342,11559" semanticType="callout" shapeName="Other">
+            <msink:sourceLink direction="with" ref="{B978D658-EA5F-463B-968E-3987286119F9}"/>
             <msink:sourceLink direction="with" ref="{C04AEB53-6A9E-40BD-AE40-D91A0C97586B}"/>
-            <msink:sourceLink direction="with" ref="{B978D658-EA5F-463B-968E-3987286119F9}"/>
           </msink:context>
         </emma:interpretation>
       </emma:emma>
@@ -360,10 +368,10 @@
             </emma:emma>
           </inkml:annotationXML>
           <inkml:trace contextRef="#ctx0" brushRef="#br0" timeOffset="-40191.9775">6572 4463 0,'0'-36'125,"0"-1"-109,0 1-16,0 0 16,0-1-16,0 1 46,0 0-30,0 0 15,0-1-31,0-35 47,0 35 0,0 1 0,0-36-16,0 35 32,0 1-16,0 0 15,0-1 79,0 1-141,0 0 31,36 36-15,-36-36 15</inkml:trace>
-          <inkml:trace contextRef="#ctx0" brushRef="#br0" timeOffset="-32247.6196">6681 5443 0,'-73'0'31,"73"72"16,0-36-32,0 1 1,0 35-16,0-35 16,0-1 15,0 0-15,0 37-1,0-37 1,0 0 62,0 1-78,0 35 47,0-36-16,0 1-15,0-1 46,0 0 79,0 37-126,37-37 17,-37 0-17,36 37 95,-36-109 77</inkml:trace>
+          <inkml:trace contextRef="#ctx0" brushRef="#br0" timeOffset="-32247.6193">6681 5443 0,'-73'0'31,"73"72"16,0-36-32,0 1 1,0 35-16,0-35 16,0-1 15,0 0-15,0 37-1,0-37 1,0 0 62,0 1-78,0 35 47,0-36-16,0 1-15,0-1 46,0 0 79,0 37-126,37-37 17,-37 0-17,36 37 95,-36-109 77</inkml:trace>
           <inkml:trace contextRef="#ctx0" brushRef="#br0" timeOffset="-30614.3277">4431 5370 0,'0'36'78,"0"1"-62,0 35-1,0-36 1,0 1 0,36 72-16,-36-37 15,0-36 32,0 1-31,0-1-1,0 0 1,0 37 0,0-37-1,0 0 17,0 37-32,0-37 31,0 1-16,0-1 32,0 36 16,37-35-48,-37-1 32,0 37 63,36-73 77,-36-37-187,0 1 16</inkml:trace>
           <inkml:trace contextRef="#ctx0" brushRef="#br1" timeOffset="-2.39071E6">6499 4971 0,'-72'0'47,"36"0"-16,-1 0-31,1 0 32,-37 0-17,37 0-15,0 0 16,-37-37-1,37 37-15,0 0 16,-37-72 0,37 72-16,-37 0 15,1 0 1,35 0-16,-35-37 16,36 37-16,-1 0 15,1 0 1,0 0-16,-1 0 15,1 0 17,0 0-32,0 0 15,-1 0 1,-35 0 0,35 0-16,1 0 15,-36 0-15,35 0 16,1 0-16,0 0 15,-73 0-15,36 0 16,37 0-16,0 0 16,-37 0-1,37 0-15,-73 0 16,73 73 0,-1-73-1,1 0-15,-36 0 0,35 0 31,1 0-15,0 0 0,36 36-1,-73-36 1,37 0 0,0 0-1,-1 0 1,1 0-1,-37 0 1,37 0 0,0 37 15,0-37-15,-1 0-16,1 0 15,-37 0 1,1 0-1,36 0-15,-1 0 16,1 0 0,-37 0-1,1 0 17,36 0-17,-37 0 1,37 0-1,-1 0 1,1 0 0,-36 0-1,35 0-15,1 0 32,0 0-17,-37 0 1,37 0-16,0 0 15,-37 0 1,37 0-16,-1 0 16,-35 72-16,36-72 31,-1 0-15,1 0 15,0 0-16,-37 0 32,37 0-31,0 0 0,-37 0 15,37 0-16,-1 0 1,1 0 47,-36 0-32</inkml:trace>
-          <inkml:trace contextRef="#ctx0" brushRef="#br0" timeOffset="-28399.6332">4286 4463 0,'0'-36'187,"0"-1"-140,36 1 0,-36-37 31,0 37-46,0 0 46,0-37-31,0 37 31,0 0-31,0-1 46,0 1 1,37 36-94,-37-72 78</inkml:trace>
+          <inkml:trace contextRef="#ctx0" brushRef="#br0" timeOffset="-28399.6331">4286 4463 0,'0'-36'187,"0"-1"-140,36 1 0,-36-37 31,0 37-46,0 0 46,0-37-31,0 37 31,0 0-31,0-1 46,0 1 1,37 36-94,-37-72 78</inkml:trace>
           <inkml:trace contextRef="#ctx0" brushRef="#br0" timeOffset="-24335.9136">2073 4499 0,'-73'0'125,"73"-36"-94,0 0 0,0-1 1,0 1-17,0 0 1,0-1-1,0 1 17,0 0 30,0 0-31,0-37-15,0 37 62,0-1-47,0 1 16,0-36 110,0 35-17,-36 37-124,36-36 703,0 0-548,0-1 173</inkml:trace>
           <inkml:trace contextRef="#ctx0" brushRef="#br0" timeOffset="-37743.8439">8277 4971 0,'-36'-73'63,"0"73"-1,-37 0-31,37 37-15,0-37 0,-1 0 15,-35 0-15,72 36-1,-36-36 1,-1 0 15,1 0 0,-37 0 1,37 0-17,0 0 1,-37 0-1,37 0 17,0 0-32,-1 0 15,1 0 1,-36 0 31,35 0-32,1 0 1,-37-73 15,37 73 32,0 0-32,0 0 47,-37 0-31,37 0 0,-1 0 78,1 0 0,72 0 47</inkml:trace>
         </inkml:traceGroup>
@@ -375,7 +383,7 @@
               </emma:interpretation>
             </emma:emma>
           </inkml:annotationXML>
-          <inkml:trace contextRef="#ctx0" brushRef="#br0" timeOffset="-21008.2592">1528 4898 0,'-36'0'110,"0"0"-63,-1 0-47,-35 0 15,36 0 1,-1 0 0,1 0-1,-37 0 16,37 0 1,0 0-1,0 0 0,-1 0 32,-35 0-16,35 0-16,1 0 0,-36 0 0,35 37 1,1-37-1,0 0 0,-37 0 0,73 36-15,-36-36 0,0 72-1,-1-72 1,-35 0-1,35 0 1,-35 0 0,36 0 15,-37 0 94,37 0-125,-1 0 31,-35 0 79,36 0-48,36-36 360</inkml:trace>
+          <inkml:trace contextRef="#ctx0" brushRef="#br0" timeOffset="-21008.2591">1528 4898 0,'-36'0'110,"0"0"-63,-1 0-47,-35 0 15,36 0 1,-1 0 0,1 0-1,-37 0 16,37 0 1,0 0-1,0 0 0,-1 0 32,-35 0-16,35 0-16,1 0 0,-36 0 0,35 37 1,1-37-1,0 0 0,-37 0 0,73 36-15,-36-36 0,0 72-1,-1-72 1,-35 0-1,35 0 1,-35 0 0,36 0 15,-37 0 94,37 0-125,-1 0 31,-35 0 79,36 0-48,36-36 360</inkml:trace>
         </inkml:traceGroup>
       </inkml:traceGroup>
     </inkml:traceGroup>
@@ -564,8 +572,8 @@
       <emma:emma xmlns:emma="http://www.w3.org/2003/04/emma" version="1.0">
         <emma:interpretation id="{4A3FBDBB-7F2C-4E63-8C97-351E4F9310D3}" emma:medium="tactile" emma:mode="ink">
           <msink:context xmlns:msink="http://schemas.microsoft.com/ink/2010/main" type="inkDrawing" rotatedBoundingBox="12072,11474 21566,10085 22086,13640 12593,15029" semanticType="callout" shapeName="Other">
+            <msink:sourceLink direction="with" ref="{9CA23B30-27A5-4734-AED9-024CC4C336C5}"/>
             <msink:sourceLink direction="with" ref="{5012882F-2829-493B-93EF-14E9EB97B566}"/>
-            <msink:sourceLink direction="with" ref="{9CA23B30-27A5-4734-AED9-024CC4C336C5}"/>
           </msink:context>
         </emma:interpretation>
       </emma:emma>
@@ -827,7 +835,7 @@
               </emma:interpretation>
             </emma:emma>
           </inkml:annotationXML>
-          <inkml:trace contextRef="#ctx0" brushRef="#br4" timeOffset="-12751.6552">5878 7911 0,'37'0'47,"-1"0"-31,0 36-16,1-36 16,71 0-1,-71 0 1,-1 73 31,37-73 15,-73 36 16,0 0 32,-37-36-79,37 36-31,0 1 16,-36-37-16,36 36 15,0 0-15,0 1 31,-36-37-31,36 72 16,-37-72 0,37 36-1,0 1-15,-72-37 16</inkml:trace>
+          <inkml:trace contextRef="#ctx0" brushRef="#br4" timeOffset="-12751.6549">5878 7911 0,'37'0'47,"-1"0"-31,0 36-16,1-36 16,71 0-1,-71 0 1,-1 73 31,37-73 15,-73 36 16,0 0 32,-37-36-79,37 36-31,0 1 16,-36-37-16,36 36 15,0 0-15,0 1 31,-36-37-31,36 72 16,-37-72 0,37 36-1,0 1-15,-72-37 16</inkml:trace>
         </inkml:traceGroup>
         <inkml:traceGroup>
           <inkml:annotationXML>
@@ -1016,8 +1024,8 @@
             <emma:emma xmlns:emma="http://www.w3.org/2003/04/emma" version="1.0">
               <emma:interpretation id="{5012882F-2829-493B-93EF-14E9EB97B566}" emma:medium="tactile" emma:mode="ink">
                 <msink:context xmlns:msink="http://schemas.microsoft.com/ink/2010/main" type="inkWord" rotatedBoundingBox="11720,12409 12845,12409 12845,14623 11720,14623">
+                  <msink:destinationLink direction="with" ref="{4A3FBDBB-7F2C-4E63-8C97-351E4F9310D3}"/>
                   <msink:destinationLink direction="from" ref="{6DBEBE5E-A317-49C9-818E-0CA68F2319AE}"/>
-                  <msink:destinationLink direction="with" ref="{4A3FBDBB-7F2C-4E63-8C97-351E4F9310D3}"/>
                 </msink:context>
               </emma:interpretation>
             </emma:emma>
@@ -1405,7 +1413,7 @@
           <a:p>
             <a:fld id="{058317C4-C6B7-4095-910A-0B79FF793E60}" type="datetimeFigureOut">
               <a:rPr lang="en-US" smtClean="0"/>
-              <a:t>5/27/2021</a:t>
+              <a:t>6/6/2021</a:t>
             </a:fld>
             <a:endParaRPr lang="en-US"/>
           </a:p>
@@ -1662,7 +1670,7 @@
           <a:p>
             <a:fld id="{058317C4-C6B7-4095-910A-0B79FF793E60}" type="datetimeFigureOut">
               <a:rPr lang="en-US" smtClean="0"/>
-              <a:t>5/27/2021</a:t>
+              <a:t>6/6/2021</a:t>
             </a:fld>
             <a:endParaRPr lang="en-US"/>
           </a:p>
@@ -1832,7 +1840,7 @@
           <a:p>
             <a:fld id="{058317C4-C6B7-4095-910A-0B79FF793E60}" type="datetimeFigureOut">
               <a:rPr lang="en-US" smtClean="0"/>
-              <a:t>5/27/2021</a:t>
+              <a:t>6/6/2021</a:t>
             </a:fld>
             <a:endParaRPr lang="en-US"/>
           </a:p>
@@ -2012,7 +2020,7 @@
           <a:p>
             <a:fld id="{058317C4-C6B7-4095-910A-0B79FF793E60}" type="datetimeFigureOut">
               <a:rPr lang="en-US" smtClean="0"/>
-              <a:t>5/27/2021</a:t>
+              <a:t>6/6/2021</a:t>
             </a:fld>
             <a:endParaRPr lang="en-US"/>
           </a:p>
@@ -2294,7 +2302,7 @@
           <a:p>
             <a:fld id="{058317C4-C6B7-4095-910A-0B79FF793E60}" type="datetimeFigureOut">
               <a:rPr lang="en-US" smtClean="0"/>
-              <a:t>5/27/2021</a:t>
+              <a:t>6/6/2021</a:t>
             </a:fld>
             <a:endParaRPr lang="en-US"/>
           </a:p>
@@ -2541,7 +2549,7 @@
           <a:p>
             <a:fld id="{058317C4-C6B7-4095-910A-0B79FF793E60}" type="datetimeFigureOut">
               <a:rPr lang="en-US" smtClean="0"/>
-              <a:t>5/27/2021</a:t>
+              <a:t>6/6/2021</a:t>
             </a:fld>
             <a:endParaRPr lang="en-US"/>
           </a:p>
@@ -2787,7 +2795,7 @@
           <a:p>
             <a:fld id="{058317C4-C6B7-4095-910A-0B79FF793E60}" type="datetimeFigureOut">
               <a:rPr lang="en-US" smtClean="0"/>
-              <a:t>5/27/2021</a:t>
+              <a:t>6/6/2021</a:t>
             </a:fld>
             <a:endParaRPr lang="en-US"/>
           </a:p>
@@ -3075,7 +3083,7 @@
           <a:p>
             <a:fld id="{058317C4-C6B7-4095-910A-0B79FF793E60}" type="datetimeFigureOut">
               <a:rPr lang="en-US" smtClean="0"/>
-              <a:t>5/27/2021</a:t>
+              <a:t>6/6/2021</a:t>
             </a:fld>
             <a:endParaRPr lang="en-US"/>
           </a:p>
@@ -3563,7 +3571,7 @@
           <a:p>
             <a:fld id="{058317C4-C6B7-4095-910A-0B79FF793E60}" type="datetimeFigureOut">
               <a:rPr lang="en-US" smtClean="0"/>
-              <a:t>5/27/2021</a:t>
+              <a:t>6/6/2021</a:t>
             </a:fld>
             <a:endParaRPr lang="en-US"/>
           </a:p>
@@ -3681,7 +3689,7 @@
           <a:p>
             <a:fld id="{058317C4-C6B7-4095-910A-0B79FF793E60}" type="datetimeFigureOut">
               <a:rPr lang="en-US" smtClean="0"/>
-              <a:t>5/27/2021</a:t>
+              <a:t>6/6/2021</a:t>
             </a:fld>
             <a:endParaRPr lang="en-US"/>
           </a:p>
@@ -3776,7 +3784,7 @@
           <a:p>
             <a:fld id="{058317C4-C6B7-4095-910A-0B79FF793E60}" type="datetimeFigureOut">
               <a:rPr lang="en-US" smtClean="0"/>
-              <a:t>5/27/2021</a:t>
+              <a:t>6/6/2021</a:t>
             </a:fld>
             <a:endParaRPr lang="en-US"/>
           </a:p>
@@ -4053,7 +4061,7 @@
           <a:p>
             <a:fld id="{058317C4-C6B7-4095-910A-0B79FF793E60}" type="datetimeFigureOut">
               <a:rPr lang="en-US" smtClean="0"/>
-              <a:t>5/27/2021</a:t>
+              <a:t>6/6/2021</a:t>
             </a:fld>
             <a:endParaRPr lang="en-US"/>
           </a:p>
@@ -4275,7 +4283,7 @@
           <a:p>
             <a:fld id="{058317C4-C6B7-4095-910A-0B79FF793E60}" type="datetimeFigureOut">
               <a:rPr lang="en-US" smtClean="0"/>
-              <a:t>5/27/2021</a:t>
+              <a:t>6/6/2021</a:t>
             </a:fld>
             <a:endParaRPr lang="en-US"/>
           </a:p>
@@ -5758,7 +5766,7 @@
             </a:pPr>
             <a:r>
               <a:rPr lang="fa-IR" sz="2800" dirty="0" smtClean="0"/>
-              <a:t>مهمترین قسمت هم زمانی که به جایی رسیدیم که آخر خط بودم دیگه راهی نداشتیم باید به عقب برگردیم پس کافیه آخرین المان وکتور </a:t>
+              <a:t>مهمترین قسمت هم زمانی هست که به جایی رسیدیم که آخر خط است و دیگر راهی نداریم باید به عقب برگردیم پس کافیه آخرین المان وکتور </a:t>
             </a:r>
             <a:r>
               <a:rPr lang="en-US" sz="2800" dirty="0" smtClean="0"/>
@@ -6181,357 +6189,9 @@
                   <a:srgbClr val="00B050"/>
                 </a:solidFill>
               </a:rPr>
-              <a:t>            if(curY1)</a:t>
-            </a:r>
-          </a:p>
-          <a:p>
-            <a:pPr marL="0" indent="0">
-              <a:buNone/>
-            </a:pPr>
-            <a:r>
-              <a:rPr lang="en-US" sz="2300" dirty="0">
-                <a:solidFill>
-                  <a:srgbClr val="00B050"/>
-                </a:solidFill>
-              </a:rPr>
-              <a:t>                if((maze[curX1][curY1-1].</a:t>
-            </a:r>
-            <a:r>
-              <a:rPr lang="en-US" sz="2300" dirty="0" err="1">
-                <a:solidFill>
-                  <a:srgbClr val="00B050"/>
-                </a:solidFill>
-              </a:rPr>
-              <a:t>getWalls</a:t>
-            </a:r>
-            <a:r>
-              <a:rPr lang="en-US" sz="2300" dirty="0">
-                <a:solidFill>
-                  <a:srgbClr val="00B050"/>
-                </a:solidFill>
-              </a:rPr>
-              <a:t>() &amp; </a:t>
-            </a:r>
-            <a:r>
-              <a:rPr lang="en-US" sz="2300" u="sng" dirty="0">
-                <a:solidFill>
-                  <a:srgbClr val="00B050"/>
-                </a:solidFill>
-              </a:rPr>
-              <a:t>Maze</a:t>
-            </a:r>
-            <a:r>
-              <a:rPr lang="en-US" sz="2300" dirty="0">
-                <a:solidFill>
-                  <a:srgbClr val="00B050"/>
-                </a:solidFill>
-              </a:rPr>
-              <a:t>::</a:t>
-            </a:r>
-            <a:r>
-              <a:rPr lang="en-US" sz="2300" u="sng" dirty="0">
-                <a:solidFill>
-                  <a:srgbClr val="00B050"/>
-                </a:solidFill>
-              </a:rPr>
-              <a:t>Cell</a:t>
-            </a:r>
-            <a:r>
-              <a:rPr lang="en-US" sz="2300" dirty="0">
-                <a:solidFill>
-                  <a:srgbClr val="00B050"/>
-                </a:solidFill>
-              </a:rPr>
-              <a:t>::WALL_EAST) == 0 &amp;&amp; maze[curX1][curY1-1].visited() == false)</a:t>
-            </a:r>
-          </a:p>
-          <a:p>
-            <a:pPr marL="0" indent="0">
-              <a:buNone/>
-            </a:pPr>
-            <a:r>
-              <a:rPr lang="en-US" sz="2300" dirty="0">
-                <a:solidFill>
-                  <a:srgbClr val="00B050"/>
-                </a:solidFill>
-              </a:rPr>
-              <a:t>                    live1.push_back(WEST);</a:t>
-            </a:r>
-          </a:p>
-          <a:p>
-            <a:pPr marL="0" indent="0">
-              <a:buNone/>
-            </a:pPr>
-            <a:r>
-              <a:rPr lang="en-US" sz="2300" dirty="0">
-                <a:solidFill>
-                  <a:srgbClr val="00B050"/>
-                </a:solidFill>
-              </a:rPr>
-              <a:t>            if(curY1&lt;COLS-1)</a:t>
-            </a:r>
-          </a:p>
-          <a:p>
-            <a:pPr marL="0" indent="0">
-              <a:buNone/>
-            </a:pPr>
-            <a:r>
-              <a:rPr lang="en-US" sz="2300" dirty="0">
-                <a:solidFill>
-                  <a:srgbClr val="00B050"/>
-                </a:solidFill>
-              </a:rPr>
-              <a:t>                if((maze[curX1][curY1+1].</a:t>
-            </a:r>
-            <a:r>
-              <a:rPr lang="en-US" sz="2300" dirty="0" err="1">
-                <a:solidFill>
-                  <a:srgbClr val="00B050"/>
-                </a:solidFill>
-              </a:rPr>
-              <a:t>getWalls</a:t>
-            </a:r>
-            <a:r>
-              <a:rPr lang="en-US" sz="2300" dirty="0">
-                <a:solidFill>
-                  <a:srgbClr val="00B050"/>
-                </a:solidFill>
-              </a:rPr>
-              <a:t>() &amp; </a:t>
-            </a:r>
-            <a:r>
-              <a:rPr lang="en-US" sz="2300" u="sng" dirty="0">
-                <a:solidFill>
-                  <a:srgbClr val="00B050"/>
-                </a:solidFill>
-              </a:rPr>
-              <a:t>Maze</a:t>
-            </a:r>
-            <a:r>
-              <a:rPr lang="en-US" sz="2300" dirty="0">
-                <a:solidFill>
-                  <a:srgbClr val="00B050"/>
-                </a:solidFill>
-              </a:rPr>
-              <a:t>::</a:t>
-            </a:r>
-            <a:r>
-              <a:rPr lang="en-US" sz="2300" u="sng" dirty="0">
-                <a:solidFill>
-                  <a:srgbClr val="00B050"/>
-                </a:solidFill>
-              </a:rPr>
-              <a:t>Cell</a:t>
-            </a:r>
-            <a:r>
-              <a:rPr lang="en-US" sz="2300" dirty="0">
-                <a:solidFill>
-                  <a:srgbClr val="00B050"/>
-                </a:solidFill>
-              </a:rPr>
-              <a:t>::WALL_WEST) == 0 &amp;&amp; maze[curX1][curY1+1].visited() == false)</a:t>
-            </a:r>
-          </a:p>
-          <a:p>
-            <a:pPr marL="0" indent="0">
-              <a:buNone/>
-            </a:pPr>
-            <a:r>
-              <a:rPr lang="en-US" sz="2300" dirty="0">
-                <a:solidFill>
-                  <a:srgbClr val="00B050"/>
-                </a:solidFill>
-              </a:rPr>
-              <a:t>                    live1.push_back(EAST);</a:t>
-            </a:r>
-          </a:p>
-          <a:p>
-            <a:pPr marL="0" indent="0">
-              <a:buNone/>
-            </a:pPr>
-            <a:r>
-              <a:rPr lang="en-US" sz="2300" dirty="0">
-                <a:solidFill>
-                  <a:srgbClr val="00B050"/>
-                </a:solidFill>
-              </a:rPr>
-              <a:t>            if(curX1)</a:t>
-            </a:r>
-          </a:p>
-          <a:p>
-            <a:pPr marL="0" indent="0">
-              <a:buNone/>
-            </a:pPr>
-            <a:r>
-              <a:rPr lang="en-US" sz="2300" dirty="0">
-                <a:solidFill>
-                  <a:srgbClr val="00B050"/>
-                </a:solidFill>
-              </a:rPr>
-              <a:t>                if((maze[curX1-1][curY1].</a:t>
-            </a:r>
-            <a:r>
-              <a:rPr lang="en-US" sz="2300" dirty="0" err="1">
-                <a:solidFill>
-                  <a:srgbClr val="00B050"/>
-                </a:solidFill>
-              </a:rPr>
-              <a:t>getWalls</a:t>
-            </a:r>
-            <a:r>
-              <a:rPr lang="en-US" sz="2300" dirty="0">
-                <a:solidFill>
-                  <a:srgbClr val="00B050"/>
-                </a:solidFill>
-              </a:rPr>
-              <a:t>() &amp; </a:t>
-            </a:r>
-            <a:r>
-              <a:rPr lang="en-US" sz="2300" u="sng" dirty="0">
-                <a:solidFill>
-                  <a:srgbClr val="00B050"/>
-                </a:solidFill>
-              </a:rPr>
-              <a:t>Maze</a:t>
-            </a:r>
-            <a:r>
-              <a:rPr lang="en-US" sz="2300" dirty="0">
-                <a:solidFill>
-                  <a:srgbClr val="00B050"/>
-                </a:solidFill>
-              </a:rPr>
-              <a:t>::</a:t>
-            </a:r>
-            <a:r>
-              <a:rPr lang="en-US" sz="2300" u="sng" dirty="0">
-                <a:solidFill>
-                  <a:srgbClr val="00B050"/>
-                </a:solidFill>
-              </a:rPr>
-              <a:t>Cell</a:t>
-            </a:r>
-            <a:r>
-              <a:rPr lang="en-US" sz="2300" dirty="0">
-                <a:solidFill>
-                  <a:srgbClr val="00B050"/>
-                </a:solidFill>
-              </a:rPr>
-              <a:t>::WALL_SOUTH) == 0 &amp;&amp; maze[curX1-1][curY1].visited() == false)</a:t>
-            </a:r>
-          </a:p>
-          <a:p>
-            <a:pPr marL="0" indent="0">
-              <a:buNone/>
-            </a:pPr>
-            <a:r>
-              <a:rPr lang="en-US" sz="2300" dirty="0">
-                <a:solidFill>
-                  <a:srgbClr val="00B050"/>
-                </a:solidFill>
-              </a:rPr>
-              <a:t>                    live1.push_back(NORTH);</a:t>
-            </a:r>
-          </a:p>
-          <a:p>
-            <a:pPr marL="0" indent="0">
-              <a:buNone/>
-            </a:pPr>
-            <a:r>
-              <a:rPr lang="en-US" sz="2300" dirty="0">
-                <a:solidFill>
-                  <a:srgbClr val="00B050"/>
-                </a:solidFill>
-              </a:rPr>
-              <a:t>            if(curX1&lt;ROWS-1)</a:t>
-            </a:r>
-          </a:p>
-          <a:p>
-            <a:pPr marL="0" indent="0">
-              <a:buNone/>
-            </a:pPr>
-            <a:r>
-              <a:rPr lang="en-US" sz="2300" dirty="0">
-                <a:solidFill>
-                  <a:srgbClr val="00B050"/>
-                </a:solidFill>
-              </a:rPr>
-              <a:t>                if((maze[curX1+1][curY1].</a:t>
-            </a:r>
-            <a:r>
-              <a:rPr lang="en-US" sz="2300" dirty="0" err="1">
-                <a:solidFill>
-                  <a:srgbClr val="00B050"/>
-                </a:solidFill>
-              </a:rPr>
-              <a:t>getWalls</a:t>
-            </a:r>
-            <a:r>
-              <a:rPr lang="en-US" sz="2300" dirty="0">
-                <a:solidFill>
-                  <a:srgbClr val="00B050"/>
-                </a:solidFill>
-              </a:rPr>
-              <a:t>() &amp; </a:t>
-            </a:r>
-            <a:r>
-              <a:rPr lang="en-US" sz="2300" u="sng" dirty="0">
-                <a:solidFill>
-                  <a:srgbClr val="00B050"/>
-                </a:solidFill>
-              </a:rPr>
-              <a:t>Maze</a:t>
-            </a:r>
-            <a:r>
-              <a:rPr lang="en-US" sz="2300" dirty="0">
-                <a:solidFill>
-                  <a:srgbClr val="00B050"/>
-                </a:solidFill>
-              </a:rPr>
-              <a:t>::</a:t>
-            </a:r>
-            <a:r>
-              <a:rPr lang="en-US" sz="2300" u="sng" dirty="0">
-                <a:solidFill>
-                  <a:srgbClr val="00B050"/>
-                </a:solidFill>
-              </a:rPr>
-              <a:t>Cell</a:t>
-            </a:r>
-            <a:r>
-              <a:rPr lang="en-US" sz="2300" dirty="0">
-                <a:solidFill>
-                  <a:srgbClr val="00B050"/>
-                </a:solidFill>
-              </a:rPr>
-              <a:t>::WALL_NORTH) == 0 &amp;&amp; maze[curX1+1][curY1].visited() == false)</a:t>
-            </a:r>
-          </a:p>
-          <a:p>
-            <a:pPr marL="0" indent="0">
-              <a:buNone/>
-            </a:pPr>
-            <a:r>
-              <a:rPr lang="en-US" sz="2300" dirty="0">
-                <a:solidFill>
-                  <a:srgbClr val="00B050"/>
-                </a:solidFill>
-              </a:rPr>
-              <a:t>                    live1.push_back(SOUTH);</a:t>
-            </a:r>
-          </a:p>
-          <a:p>
-            <a:pPr marL="0" indent="0">
-              <a:buNone/>
-            </a:pPr>
-            <a:r>
-              <a:rPr lang="en-US" sz="2000" dirty="0" smtClean="0">
-                <a:solidFill>
-                  <a:srgbClr val="00B050"/>
-                </a:solidFill>
-              </a:rPr>
-              <a:t>----------------------------------------------------------</a:t>
-            </a:r>
-            <a:endParaRPr lang="fa-IR" sz="2000" dirty="0">
+              <a:t>        </a:t>
+            </a:r>
+            <a:endParaRPr lang="en-US" sz="2300" dirty="0" smtClean="0">
               <a:solidFill>
                 <a:srgbClr val="00B050"/>
               </a:solidFill>
@@ -6541,7 +6201,51 @@
             <a:pPr marL="0" indent="0">
               <a:buNone/>
             </a:pPr>
-            <a:endParaRPr lang="fa-IR" sz="2000" dirty="0">
+            <a:r>
+              <a:rPr lang="en-US" dirty="0"/>
+              <a:t>    </a:t>
+            </a:r>
+            <a:r>
+              <a:rPr lang="en-US" sz="2600" dirty="0">
+                <a:solidFill>
+                  <a:srgbClr val="00B050"/>
+                </a:solidFill>
+              </a:rPr>
+              <a:t>    while(maze[</a:t>
+            </a:r>
+            <a:r>
+              <a:rPr lang="en-US" sz="2600" dirty="0" err="1">
+                <a:solidFill>
+                  <a:srgbClr val="00B050"/>
+                </a:solidFill>
+              </a:rPr>
+              <a:t>x_target</a:t>
+            </a:r>
+            <a:r>
+              <a:rPr lang="en-US" sz="2600" dirty="0">
+                <a:solidFill>
+                  <a:srgbClr val="00B050"/>
+                </a:solidFill>
+              </a:rPr>
+              <a:t>][</a:t>
+            </a:r>
+            <a:r>
+              <a:rPr lang="en-US" sz="2600" dirty="0" err="1">
+                <a:solidFill>
+                  <a:srgbClr val="00B050"/>
+                </a:solidFill>
+              </a:rPr>
+              <a:t>y_target</a:t>
+            </a:r>
+            <a:r>
+              <a:rPr lang="en-US" sz="2600" dirty="0">
+                <a:solidFill>
+                  <a:srgbClr val="00B050"/>
+                </a:solidFill>
+              </a:rPr>
+              <a:t>].visited() == false) </a:t>
+            </a:r>
+            <a:endParaRPr lang="en-US" sz="2600" dirty="0" smtClean="0">
               <a:solidFill>
                 <a:srgbClr val="00B050"/>
               </a:solidFill>
@@ -6552,54 +6256,40 @@
               <a:buNone/>
             </a:pPr>
             <a:r>
-              <a:rPr lang="en-US" sz="2000" dirty="0">
-                <a:solidFill>
-                  <a:srgbClr val="00B050"/>
-                </a:solidFill>
-              </a:rPr>
-              <a:t>switch(live1[rand() % live1.size()]) {</a:t>
-            </a:r>
+              <a:rPr lang="en-US" sz="2600" dirty="0" smtClean="0">
+                <a:solidFill>
+                  <a:srgbClr val="00B050"/>
+                </a:solidFill>
+              </a:rPr>
+              <a:t>---------------------------------------------------</a:t>
+            </a:r>
+            <a:endParaRPr lang="en-US" sz="2600" dirty="0">
+              <a:solidFill>
+                <a:srgbClr val="00B050"/>
+              </a:solidFill>
+            </a:endParaRPr>
           </a:p>
           <a:p>
             <a:pPr marL="0" indent="0">
               <a:buNone/>
             </a:pPr>
-            <a:r>
-              <a:rPr lang="en-US" sz="2000" dirty="0">
-                <a:solidFill>
-                  <a:srgbClr val="00B050"/>
-                </a:solidFill>
-              </a:rPr>
-              <a:t>                    case 0: //NORTH</a:t>
-            </a:r>
+            <a:endParaRPr lang="en-US" sz="2300" dirty="0">
+              <a:solidFill>
+                <a:srgbClr val="00B050"/>
+              </a:solidFill>
+            </a:endParaRPr>
           </a:p>
           <a:p>
             <a:pPr marL="0" indent="0">
               <a:buNone/>
             </a:pPr>
             <a:r>
-              <a:rPr lang="en-US" sz="2000" dirty="0">
-                <a:solidFill>
-                  <a:srgbClr val="00B050"/>
-                </a:solidFill>
-              </a:rPr>
-              <a:t>                        maze[--curX1][curY1].</a:t>
-            </a:r>
-            <a:r>
-              <a:rPr lang="en-US" sz="2000" dirty="0" err="1">
-                <a:solidFill>
-                  <a:srgbClr val="00B050"/>
-                </a:solidFill>
-              </a:rPr>
-              <a:t>setVisited</a:t>
-            </a:r>
-            <a:r>
-              <a:rPr lang="en-US" sz="2000" dirty="0">
-                <a:solidFill>
-                  <a:srgbClr val="00B050"/>
-                </a:solidFill>
-              </a:rPr>
-              <a:t>(true);</a:t>
+              <a:rPr lang="en-US" sz="2300" dirty="0">
+                <a:solidFill>
+                  <a:srgbClr val="00B050"/>
+                </a:solidFill>
+              </a:rPr>
+              <a:t>    if(curY1)</a:t>
             </a:r>
           </a:p>
           <a:p>
@@ -6607,13 +6297,340 @@
               <a:buNone/>
             </a:pPr>
             <a:r>
-              <a:rPr lang="en-US" sz="2000" dirty="0">
-                <a:solidFill>
-                  <a:srgbClr val="00B050"/>
-                </a:solidFill>
-              </a:rPr>
-              <a:t>                        break;</a:t>
-            </a:r>
+              <a:rPr lang="en-US" sz="2300" dirty="0">
+                <a:solidFill>
+                  <a:srgbClr val="00B050"/>
+                </a:solidFill>
+              </a:rPr>
+              <a:t>                if((maze[curX1][curY1-1].</a:t>
+            </a:r>
+            <a:r>
+              <a:rPr lang="en-US" sz="2300" dirty="0" err="1">
+                <a:solidFill>
+                  <a:srgbClr val="00B050"/>
+                </a:solidFill>
+              </a:rPr>
+              <a:t>getWalls</a:t>
+            </a:r>
+            <a:r>
+              <a:rPr lang="en-US" sz="2300" dirty="0">
+                <a:solidFill>
+                  <a:srgbClr val="00B050"/>
+                </a:solidFill>
+              </a:rPr>
+              <a:t>() &amp; </a:t>
+            </a:r>
+            <a:r>
+              <a:rPr lang="en-US" sz="2300" u="sng" dirty="0">
+                <a:solidFill>
+                  <a:srgbClr val="00B050"/>
+                </a:solidFill>
+              </a:rPr>
+              <a:t>Maze</a:t>
+            </a:r>
+            <a:r>
+              <a:rPr lang="en-US" sz="2300" dirty="0">
+                <a:solidFill>
+                  <a:srgbClr val="00B050"/>
+                </a:solidFill>
+              </a:rPr>
+              <a:t>::</a:t>
+            </a:r>
+            <a:r>
+              <a:rPr lang="en-US" sz="2300" u="sng" dirty="0">
+                <a:solidFill>
+                  <a:srgbClr val="00B050"/>
+                </a:solidFill>
+              </a:rPr>
+              <a:t>Cell</a:t>
+            </a:r>
+            <a:r>
+              <a:rPr lang="en-US" sz="2300" dirty="0">
+                <a:solidFill>
+                  <a:srgbClr val="00B050"/>
+                </a:solidFill>
+              </a:rPr>
+              <a:t>::WALL_EAST) == 0 &amp;&amp; maze[curX1][curY1-1].visited() == false)</a:t>
+            </a:r>
+          </a:p>
+          <a:p>
+            <a:pPr marL="0" indent="0">
+              <a:buNone/>
+            </a:pPr>
+            <a:r>
+              <a:rPr lang="en-US" sz="2300" dirty="0">
+                <a:solidFill>
+                  <a:srgbClr val="00B050"/>
+                </a:solidFill>
+              </a:rPr>
+              <a:t>                    live1.push_back(WEST);</a:t>
+            </a:r>
+          </a:p>
+          <a:p>
+            <a:pPr marL="0" indent="0">
+              <a:buNone/>
+            </a:pPr>
+            <a:r>
+              <a:rPr lang="en-US" sz="2300" dirty="0">
+                <a:solidFill>
+                  <a:srgbClr val="00B050"/>
+                </a:solidFill>
+              </a:rPr>
+              <a:t>            if(curY1&lt;COLS-1)</a:t>
+            </a:r>
+          </a:p>
+          <a:p>
+            <a:pPr marL="0" indent="0">
+              <a:buNone/>
+            </a:pPr>
+            <a:r>
+              <a:rPr lang="en-US" sz="2300" dirty="0">
+                <a:solidFill>
+                  <a:srgbClr val="00B050"/>
+                </a:solidFill>
+              </a:rPr>
+              <a:t>                if((maze[curX1][curY1+1].</a:t>
+            </a:r>
+            <a:r>
+              <a:rPr lang="en-US" sz="2300" dirty="0" err="1">
+                <a:solidFill>
+                  <a:srgbClr val="00B050"/>
+                </a:solidFill>
+              </a:rPr>
+              <a:t>getWalls</a:t>
+            </a:r>
+            <a:r>
+              <a:rPr lang="en-US" sz="2300" dirty="0">
+                <a:solidFill>
+                  <a:srgbClr val="00B050"/>
+                </a:solidFill>
+              </a:rPr>
+              <a:t>() &amp; </a:t>
+            </a:r>
+            <a:r>
+              <a:rPr lang="en-US" sz="2300" u="sng" dirty="0">
+                <a:solidFill>
+                  <a:srgbClr val="00B050"/>
+                </a:solidFill>
+              </a:rPr>
+              <a:t>Maze</a:t>
+            </a:r>
+            <a:r>
+              <a:rPr lang="en-US" sz="2300" dirty="0">
+                <a:solidFill>
+                  <a:srgbClr val="00B050"/>
+                </a:solidFill>
+              </a:rPr>
+              <a:t>::</a:t>
+            </a:r>
+            <a:r>
+              <a:rPr lang="en-US" sz="2300" u="sng" dirty="0">
+                <a:solidFill>
+                  <a:srgbClr val="00B050"/>
+                </a:solidFill>
+              </a:rPr>
+              <a:t>Cell</a:t>
+            </a:r>
+            <a:r>
+              <a:rPr lang="en-US" sz="2300" dirty="0">
+                <a:solidFill>
+                  <a:srgbClr val="00B050"/>
+                </a:solidFill>
+              </a:rPr>
+              <a:t>::WALL_WEST) == 0 &amp;&amp; maze[curX1][curY1+1].visited() == false)</a:t>
+            </a:r>
+          </a:p>
+          <a:p>
+            <a:pPr marL="0" indent="0">
+              <a:buNone/>
+            </a:pPr>
+            <a:r>
+              <a:rPr lang="en-US" sz="2300" dirty="0">
+                <a:solidFill>
+                  <a:srgbClr val="00B050"/>
+                </a:solidFill>
+              </a:rPr>
+              <a:t>                    live1.push_back(EAST);</a:t>
+            </a:r>
+          </a:p>
+          <a:p>
+            <a:pPr marL="0" indent="0">
+              <a:buNone/>
+            </a:pPr>
+            <a:r>
+              <a:rPr lang="en-US" sz="2300" dirty="0">
+                <a:solidFill>
+                  <a:srgbClr val="00B050"/>
+                </a:solidFill>
+              </a:rPr>
+              <a:t>            if(curX1)</a:t>
+            </a:r>
+          </a:p>
+          <a:p>
+            <a:pPr marL="0" indent="0">
+              <a:buNone/>
+            </a:pPr>
+            <a:r>
+              <a:rPr lang="en-US" sz="2300" dirty="0">
+                <a:solidFill>
+                  <a:srgbClr val="00B050"/>
+                </a:solidFill>
+              </a:rPr>
+              <a:t>                if((maze[curX1-1][curY1].</a:t>
+            </a:r>
+            <a:r>
+              <a:rPr lang="en-US" sz="2300" dirty="0" err="1">
+                <a:solidFill>
+                  <a:srgbClr val="00B050"/>
+                </a:solidFill>
+              </a:rPr>
+              <a:t>getWalls</a:t>
+            </a:r>
+            <a:r>
+              <a:rPr lang="en-US" sz="2300" dirty="0">
+                <a:solidFill>
+                  <a:srgbClr val="00B050"/>
+                </a:solidFill>
+              </a:rPr>
+              <a:t>() &amp; </a:t>
+            </a:r>
+            <a:r>
+              <a:rPr lang="en-US" sz="2300" u="sng" dirty="0">
+                <a:solidFill>
+                  <a:srgbClr val="00B050"/>
+                </a:solidFill>
+              </a:rPr>
+              <a:t>Maze</a:t>
+            </a:r>
+            <a:r>
+              <a:rPr lang="en-US" sz="2300" dirty="0">
+                <a:solidFill>
+                  <a:srgbClr val="00B050"/>
+                </a:solidFill>
+              </a:rPr>
+              <a:t>::</a:t>
+            </a:r>
+            <a:r>
+              <a:rPr lang="en-US" sz="2300" u="sng" dirty="0">
+                <a:solidFill>
+                  <a:srgbClr val="00B050"/>
+                </a:solidFill>
+              </a:rPr>
+              <a:t>Cell</a:t>
+            </a:r>
+            <a:r>
+              <a:rPr lang="en-US" sz="2300" dirty="0">
+                <a:solidFill>
+                  <a:srgbClr val="00B050"/>
+                </a:solidFill>
+              </a:rPr>
+              <a:t>::WALL_SOUTH) == 0 &amp;&amp; maze[curX1-1][curY1].visited() == false)</a:t>
+            </a:r>
+          </a:p>
+          <a:p>
+            <a:pPr marL="0" indent="0">
+              <a:buNone/>
+            </a:pPr>
+            <a:r>
+              <a:rPr lang="en-US" sz="2300" dirty="0">
+                <a:solidFill>
+                  <a:srgbClr val="00B050"/>
+                </a:solidFill>
+              </a:rPr>
+              <a:t>                    live1.push_back(NORTH);</a:t>
+            </a:r>
+          </a:p>
+          <a:p>
+            <a:pPr marL="0" indent="0">
+              <a:buNone/>
+            </a:pPr>
+            <a:r>
+              <a:rPr lang="en-US" sz="2300" dirty="0">
+                <a:solidFill>
+                  <a:srgbClr val="00B050"/>
+                </a:solidFill>
+              </a:rPr>
+              <a:t>            if(curX1&lt;ROWS-1)</a:t>
+            </a:r>
+          </a:p>
+          <a:p>
+            <a:pPr marL="0" indent="0">
+              <a:buNone/>
+            </a:pPr>
+            <a:r>
+              <a:rPr lang="en-US" sz="2300" dirty="0">
+                <a:solidFill>
+                  <a:srgbClr val="00B050"/>
+                </a:solidFill>
+              </a:rPr>
+              <a:t>                if((maze[curX1+1][curY1].</a:t>
+            </a:r>
+            <a:r>
+              <a:rPr lang="en-US" sz="2300" dirty="0" err="1">
+                <a:solidFill>
+                  <a:srgbClr val="00B050"/>
+                </a:solidFill>
+              </a:rPr>
+              <a:t>getWalls</a:t>
+            </a:r>
+            <a:r>
+              <a:rPr lang="en-US" sz="2300" dirty="0">
+                <a:solidFill>
+                  <a:srgbClr val="00B050"/>
+                </a:solidFill>
+              </a:rPr>
+              <a:t>() &amp; </a:t>
+            </a:r>
+            <a:r>
+              <a:rPr lang="en-US" sz="2300" u="sng" dirty="0">
+                <a:solidFill>
+                  <a:srgbClr val="00B050"/>
+                </a:solidFill>
+              </a:rPr>
+              <a:t>Maze</a:t>
+            </a:r>
+            <a:r>
+              <a:rPr lang="en-US" sz="2300" dirty="0">
+                <a:solidFill>
+                  <a:srgbClr val="00B050"/>
+                </a:solidFill>
+              </a:rPr>
+              <a:t>::</a:t>
+            </a:r>
+            <a:r>
+              <a:rPr lang="en-US" sz="2300" u="sng" dirty="0">
+                <a:solidFill>
+                  <a:srgbClr val="00B050"/>
+                </a:solidFill>
+              </a:rPr>
+              <a:t>Cell</a:t>
+            </a:r>
+            <a:r>
+              <a:rPr lang="en-US" sz="2300" dirty="0">
+                <a:solidFill>
+                  <a:srgbClr val="00B050"/>
+                </a:solidFill>
+              </a:rPr>
+              <a:t>::WALL_NORTH) == 0 &amp;&amp; maze[curX1+1][curY1].visited() == false)</a:t>
+            </a:r>
+          </a:p>
+          <a:p>
+            <a:pPr marL="0" indent="0">
+              <a:buNone/>
+            </a:pPr>
+            <a:r>
+              <a:rPr lang="en-US" sz="2300" dirty="0">
+                <a:solidFill>
+                  <a:srgbClr val="00B050"/>
+                </a:solidFill>
+              </a:rPr>
+              <a:t>                    live1.push_back(SOUTH);</a:t>
+            </a:r>
+          </a:p>
+          <a:p>
+            <a:pPr marL="0" indent="0">
+              <a:buNone/>
+            </a:pPr>
             <a:endParaRPr lang="fa-IR" sz="2000" dirty="0">
               <a:solidFill>
                 <a:srgbClr val="00B050"/>
@@ -6697,6 +6714,1312 @@
       </p:grpSpPr>
       <p:sp>
         <p:nvSpPr>
+          <p:cNvPr id="2" name="Title 1"/>
+          <p:cNvSpPr>
+            <a:spLocks noGrp="1"/>
+          </p:cNvSpPr>
+          <p:nvPr>
+            <p:ph type="title"/>
+          </p:nvPr>
+        </p:nvSpPr>
+        <p:spPr/>
+        <p:txBody>
+          <a:bodyPr>
+            <a:normAutofit/>
+          </a:bodyPr>
+          <a:lstStyle/>
+          <a:p>
+            <a:pPr rtl="1"/>
+            <a:r>
+              <a:rPr lang="fa-IR" dirty="0" smtClean="0"/>
+              <a:t>ادامه </a:t>
+            </a:r>
+            <a:r>
+              <a:rPr lang="en-US" dirty="0" smtClean="0"/>
+              <a:t>DFS</a:t>
+            </a:r>
+            <a:endParaRPr lang="en-US" dirty="0"/>
+          </a:p>
+        </p:txBody>
+      </p:sp>
+      <p:sp>
+        <p:nvSpPr>
+          <p:cNvPr id="3" name="Content Placeholder 2"/>
+          <p:cNvSpPr>
+            <a:spLocks noGrp="1"/>
+          </p:cNvSpPr>
+          <p:nvPr>
+            <p:ph sz="half" idx="1"/>
+          </p:nvPr>
+        </p:nvSpPr>
+        <p:spPr/>
+        <p:txBody>
+          <a:bodyPr>
+            <a:noAutofit/>
+          </a:bodyPr>
+          <a:lstStyle/>
+          <a:p>
+            <a:pPr marL="0" indent="0">
+              <a:buNone/>
+            </a:pPr>
+            <a:r>
+              <a:rPr lang="en-US" sz="1400" dirty="0">
+                <a:solidFill>
+                  <a:srgbClr val="00B050"/>
+                </a:solidFill>
+              </a:rPr>
+              <a:t>            else if(live1.size() &gt; 1){</a:t>
+            </a:r>
+          </a:p>
+          <a:p>
+            <a:pPr marL="0" indent="0">
+              <a:buNone/>
+            </a:pPr>
+            <a:r>
+              <a:rPr lang="en-US" sz="1400" dirty="0">
+                <a:solidFill>
+                  <a:srgbClr val="00B050"/>
+                </a:solidFill>
+              </a:rPr>
+              <a:t>                for (</a:t>
+            </a:r>
+            <a:r>
+              <a:rPr lang="en-US" sz="1400" u="sng" dirty="0" err="1">
+                <a:solidFill>
+                  <a:srgbClr val="00B050"/>
+                </a:solidFill>
+              </a:rPr>
+              <a:t>size_t</a:t>
+            </a:r>
+            <a:r>
+              <a:rPr lang="en-US" sz="1400" dirty="0">
+                <a:solidFill>
+                  <a:srgbClr val="00B050"/>
+                </a:solidFill>
+              </a:rPr>
+              <a:t> </a:t>
+            </a:r>
+            <a:r>
+              <a:rPr lang="en-US" sz="1400" dirty="0" err="1">
+                <a:solidFill>
+                  <a:srgbClr val="00B050"/>
+                </a:solidFill>
+              </a:rPr>
+              <a:t>i</a:t>
+            </a:r>
+            <a:r>
+              <a:rPr lang="en-US" sz="1400" dirty="0">
+                <a:solidFill>
+                  <a:srgbClr val="00B050"/>
+                </a:solidFill>
+              </a:rPr>
+              <a:t> = 0; </a:t>
+            </a:r>
+            <a:r>
+              <a:rPr lang="en-US" sz="1400" dirty="0" err="1">
+                <a:solidFill>
+                  <a:srgbClr val="00B050"/>
+                </a:solidFill>
+              </a:rPr>
+              <a:t>i</a:t>
+            </a:r>
+            <a:r>
+              <a:rPr lang="en-US" sz="1400" dirty="0">
+                <a:solidFill>
+                  <a:srgbClr val="00B050"/>
+                </a:solidFill>
+              </a:rPr>
+              <a:t> &lt; live1.size(); </a:t>
+            </a:r>
+            <a:r>
+              <a:rPr lang="en-US" sz="1400" dirty="0" err="1">
+                <a:solidFill>
+                  <a:srgbClr val="00B050"/>
+                </a:solidFill>
+              </a:rPr>
+              <a:t>i</a:t>
+            </a:r>
+            <a:r>
+              <a:rPr lang="en-US" sz="1400" dirty="0">
+                <a:solidFill>
+                  <a:srgbClr val="00B050"/>
+                </a:solidFill>
+              </a:rPr>
+              <a:t>++)</a:t>
+            </a:r>
+          </a:p>
+          <a:p>
+            <a:pPr marL="0" indent="0">
+              <a:buNone/>
+            </a:pPr>
+            <a:r>
+              <a:rPr lang="en-US" sz="1400" dirty="0">
+                <a:solidFill>
+                  <a:srgbClr val="00B050"/>
+                </a:solidFill>
+              </a:rPr>
+              <a:t>                {</a:t>
+            </a:r>
+          </a:p>
+          <a:p>
+            <a:pPr marL="0" indent="0">
+              <a:buNone/>
+            </a:pPr>
+            <a:r>
+              <a:rPr lang="en-US" sz="1400" dirty="0">
+                <a:solidFill>
+                  <a:srgbClr val="00B050"/>
+                </a:solidFill>
+              </a:rPr>
+              <a:t>                        switch(live1[</a:t>
+            </a:r>
+            <a:r>
+              <a:rPr lang="en-US" sz="1400" dirty="0" err="1">
+                <a:solidFill>
+                  <a:srgbClr val="00B050"/>
+                </a:solidFill>
+              </a:rPr>
+              <a:t>i</a:t>
+            </a:r>
+            <a:r>
+              <a:rPr lang="en-US" sz="1400" dirty="0">
+                <a:solidFill>
+                  <a:srgbClr val="00B050"/>
+                </a:solidFill>
+              </a:rPr>
+              <a:t>]) {</a:t>
+            </a:r>
+          </a:p>
+          <a:p>
+            <a:pPr marL="0" indent="0">
+              <a:buNone/>
+            </a:pPr>
+            <a:r>
+              <a:rPr lang="en-US" sz="1400" dirty="0">
+                <a:solidFill>
+                  <a:srgbClr val="00B050"/>
+                </a:solidFill>
+              </a:rPr>
+              <a:t>                            case 0: //NORTH</a:t>
+            </a:r>
+          </a:p>
+          <a:p>
+            <a:pPr marL="0" indent="0">
+              <a:buNone/>
+            </a:pPr>
+            <a:r>
+              <a:rPr lang="en-US" sz="1400" dirty="0">
+                <a:solidFill>
+                  <a:srgbClr val="00B050"/>
+                </a:solidFill>
+              </a:rPr>
+              <a:t>                                maze[--curX1][curY1].</a:t>
+            </a:r>
+            <a:r>
+              <a:rPr lang="en-US" sz="1400" dirty="0" err="1">
+                <a:solidFill>
+                  <a:srgbClr val="00B050"/>
+                </a:solidFill>
+              </a:rPr>
+              <a:t>setVisited</a:t>
+            </a:r>
+            <a:r>
+              <a:rPr lang="en-US" sz="1400" dirty="0">
+                <a:solidFill>
+                  <a:srgbClr val="00B050"/>
+                </a:solidFill>
+              </a:rPr>
+              <a:t>(true);</a:t>
+            </a:r>
+          </a:p>
+          <a:p>
+            <a:pPr marL="0" indent="0">
+              <a:buNone/>
+            </a:pPr>
+            <a:r>
+              <a:rPr lang="en-US" sz="1400" dirty="0">
+                <a:solidFill>
+                  <a:srgbClr val="00B050"/>
+                </a:solidFill>
+              </a:rPr>
+              <a:t>                                break;</a:t>
+            </a:r>
+          </a:p>
+          <a:p>
+            <a:pPr marL="0" indent="0">
+              <a:buNone/>
+            </a:pPr>
+            <a:r>
+              <a:rPr lang="en-US" sz="1400" dirty="0">
+                <a:solidFill>
+                  <a:srgbClr val="00B050"/>
+                </a:solidFill>
+              </a:rPr>
+              <a:t>                            case 1: //SOUTH</a:t>
+            </a:r>
+          </a:p>
+          <a:p>
+            <a:pPr marL="0" indent="0">
+              <a:buNone/>
+            </a:pPr>
+            <a:r>
+              <a:rPr lang="en-US" sz="1400" dirty="0">
+                <a:solidFill>
+                  <a:srgbClr val="00B050"/>
+                </a:solidFill>
+              </a:rPr>
+              <a:t>                                maze[++curX1][curY1].</a:t>
+            </a:r>
+            <a:r>
+              <a:rPr lang="en-US" sz="1400" dirty="0" err="1">
+                <a:solidFill>
+                  <a:srgbClr val="00B050"/>
+                </a:solidFill>
+              </a:rPr>
+              <a:t>setVisited</a:t>
+            </a:r>
+            <a:r>
+              <a:rPr lang="en-US" sz="1400" dirty="0">
+                <a:solidFill>
+                  <a:srgbClr val="00B050"/>
+                </a:solidFill>
+              </a:rPr>
+              <a:t>(true);</a:t>
+            </a:r>
+          </a:p>
+          <a:p>
+            <a:pPr marL="0" indent="0">
+              <a:buNone/>
+            </a:pPr>
+            <a:r>
+              <a:rPr lang="en-US" sz="1400" dirty="0">
+                <a:solidFill>
+                  <a:srgbClr val="00B050"/>
+                </a:solidFill>
+              </a:rPr>
+              <a:t>                                break;</a:t>
+            </a:r>
+          </a:p>
+          <a:p>
+            <a:pPr marL="0" indent="0">
+              <a:buNone/>
+            </a:pPr>
+            <a:r>
+              <a:rPr lang="en-US" sz="1400" dirty="0">
+                <a:solidFill>
+                  <a:srgbClr val="00B050"/>
+                </a:solidFill>
+              </a:rPr>
+              <a:t>                            case 2: //EAST</a:t>
+            </a:r>
+          </a:p>
+          <a:p>
+            <a:pPr marL="0" indent="0">
+              <a:buNone/>
+            </a:pPr>
+            <a:r>
+              <a:rPr lang="en-US" sz="1400" dirty="0">
+                <a:solidFill>
+                  <a:srgbClr val="00B050"/>
+                </a:solidFill>
+              </a:rPr>
+              <a:t>                                maze[curX1][++curY1].</a:t>
+            </a:r>
+            <a:r>
+              <a:rPr lang="en-US" sz="1400" dirty="0" err="1">
+                <a:solidFill>
+                  <a:srgbClr val="00B050"/>
+                </a:solidFill>
+              </a:rPr>
+              <a:t>setVisited</a:t>
+            </a:r>
+            <a:r>
+              <a:rPr lang="en-US" sz="1400" dirty="0">
+                <a:solidFill>
+                  <a:srgbClr val="00B050"/>
+                </a:solidFill>
+              </a:rPr>
+              <a:t>(true);</a:t>
+            </a:r>
+          </a:p>
+          <a:p>
+            <a:pPr marL="0" indent="0">
+              <a:buNone/>
+            </a:pPr>
+            <a:r>
+              <a:rPr lang="en-US" sz="1400" dirty="0">
+                <a:solidFill>
+                  <a:srgbClr val="00B050"/>
+                </a:solidFill>
+              </a:rPr>
+              <a:t>                                break;</a:t>
+            </a:r>
+          </a:p>
+          <a:p>
+            <a:pPr marL="0" indent="0">
+              <a:buNone/>
+            </a:pPr>
+            <a:r>
+              <a:rPr lang="en-US" sz="1400" dirty="0">
+                <a:solidFill>
+                  <a:srgbClr val="00B050"/>
+                </a:solidFill>
+              </a:rPr>
+              <a:t>                            case 3: //WEST</a:t>
+            </a:r>
+          </a:p>
+          <a:p>
+            <a:pPr marL="0" indent="0">
+              <a:buNone/>
+            </a:pPr>
+            <a:r>
+              <a:rPr lang="en-US" sz="1400" dirty="0">
+                <a:solidFill>
+                  <a:srgbClr val="00B050"/>
+                </a:solidFill>
+              </a:rPr>
+              <a:t>                                maze[curX1][--curY1].</a:t>
+            </a:r>
+            <a:r>
+              <a:rPr lang="en-US" sz="1400" dirty="0" err="1">
+                <a:solidFill>
+                  <a:srgbClr val="00B050"/>
+                </a:solidFill>
+              </a:rPr>
+              <a:t>setVisited</a:t>
+            </a:r>
+            <a:r>
+              <a:rPr lang="en-US" sz="1400" dirty="0">
+                <a:solidFill>
+                  <a:srgbClr val="00B050"/>
+                </a:solidFill>
+              </a:rPr>
+              <a:t>(true);</a:t>
+            </a:r>
+          </a:p>
+          <a:p>
+            <a:pPr marL="0" indent="0">
+              <a:buNone/>
+            </a:pPr>
+            <a:r>
+              <a:rPr lang="en-US" sz="1400" dirty="0">
+                <a:solidFill>
+                  <a:srgbClr val="00B050"/>
+                </a:solidFill>
+              </a:rPr>
+              <a:t>                                break;</a:t>
+            </a:r>
+          </a:p>
+          <a:p>
+            <a:pPr marL="0" indent="0">
+              <a:buNone/>
+            </a:pPr>
+            <a:r>
+              <a:rPr lang="en-US" sz="1400" dirty="0">
+                <a:solidFill>
+                  <a:srgbClr val="00B050"/>
+                </a:solidFill>
+              </a:rPr>
+              <a:t>                        }</a:t>
+            </a:r>
+          </a:p>
+          <a:p>
+            <a:pPr marL="0" indent="0">
+              <a:buNone/>
+            </a:pPr>
+            <a:r>
+              <a:rPr lang="en-US" sz="1400" dirty="0">
+                <a:solidFill>
+                  <a:srgbClr val="00B050"/>
+                </a:solidFill>
+              </a:rPr>
+              <a:t>                    trail1.push_back(maze[curX1][curY1]);</a:t>
+            </a:r>
+          </a:p>
+          <a:p>
+            <a:pPr marL="0" indent="0">
+              <a:buNone/>
+            </a:pPr>
+            <a:r>
+              <a:rPr lang="en-US" sz="1400" dirty="0">
+                <a:solidFill>
+                  <a:srgbClr val="00B050"/>
+                </a:solidFill>
+              </a:rPr>
+              <a:t>                    break;</a:t>
+            </a:r>
+          </a:p>
+          <a:p>
+            <a:pPr marL="0" indent="0">
+              <a:buNone/>
+            </a:pPr>
+            <a:r>
+              <a:rPr lang="en-US" sz="1400" dirty="0">
+                <a:solidFill>
+                  <a:srgbClr val="00B050"/>
+                </a:solidFill>
+              </a:rPr>
+              <a:t>                }</a:t>
+            </a:r>
+          </a:p>
+          <a:p>
+            <a:pPr marL="0" indent="0">
+              <a:buNone/>
+            </a:pPr>
+            <a:endParaRPr lang="en-US" sz="1400" dirty="0">
+              <a:solidFill>
+                <a:srgbClr val="00B050"/>
+              </a:solidFill>
+            </a:endParaRPr>
+          </a:p>
+        </p:txBody>
+      </p:sp>
+      <p:sp>
+        <p:nvSpPr>
+          <p:cNvPr id="4" name="Content Placeholder 3"/>
+          <p:cNvSpPr>
+            <a:spLocks noGrp="1"/>
+          </p:cNvSpPr>
+          <p:nvPr>
+            <p:ph sz="half" idx="2"/>
+          </p:nvPr>
+        </p:nvSpPr>
+        <p:spPr>
+          <a:xfrm>
+            <a:off x="6197600" y="2050869"/>
+            <a:ext cx="5384800" cy="4075295"/>
+          </a:xfrm>
+        </p:spPr>
+        <p:txBody>
+          <a:bodyPr>
+            <a:normAutofit/>
+          </a:bodyPr>
+          <a:lstStyle/>
+          <a:p>
+            <a:pPr marL="0" indent="0" algn="r" rtl="1">
+              <a:buNone/>
+            </a:pPr>
+            <a:r>
+              <a:rPr lang="fa-IR" sz="2400" dirty="0" smtClean="0"/>
+              <a:t>برای </a:t>
+            </a:r>
+            <a:r>
+              <a:rPr lang="fa-IR" sz="2400" dirty="0"/>
+              <a:t>سلول­هایی که می­توانییم به آن­ها برویم دو حالت در نظر می­گیریم </a:t>
+            </a:r>
+            <a:r>
+              <a:rPr lang="fa-IR" sz="2400" dirty="0" smtClean="0"/>
+              <a:t>اگر </a:t>
+            </a:r>
+            <a:r>
+              <a:rPr lang="fa-IR" sz="2400" dirty="0"/>
+              <a:t>فقط </a:t>
+            </a:r>
+            <a:r>
+              <a:rPr lang="fa-IR" sz="2400" dirty="0" smtClean="0"/>
+              <a:t>یک </a:t>
+            </a:r>
+            <a:r>
+              <a:rPr lang="fa-IR" sz="2400" dirty="0"/>
+              <a:t>سلول باشد و اگر بیش از </a:t>
+            </a:r>
+            <a:r>
+              <a:rPr lang="fa-IR" sz="2400" dirty="0" smtClean="0"/>
+              <a:t>یک </a:t>
+            </a:r>
+            <a:r>
+              <a:rPr lang="fa-IR" sz="2400" dirty="0"/>
+              <a:t>باشد اگر دو تا باشد باید یکی را آنقدر ادامه دهد تا به بنبست بخورد بعد شروع به پاک کردن می­کند تا دوباره به جایی که دو انتخاب داشته باز گردد و آنجا راه جدیدی را طی می­کند</a:t>
+            </a:r>
+            <a:r>
+              <a:rPr lang="fa-IR" sz="2400" dirty="0" smtClean="0"/>
+              <a:t>. و همینگونه ادامه میدهد.</a:t>
+            </a:r>
+            <a:endParaRPr lang="en-US" sz="2400" dirty="0"/>
+          </a:p>
+          <a:p>
+            <a:pPr marL="0" indent="0" algn="r" rtl="1">
+              <a:buNone/>
+            </a:pPr>
+            <a:endParaRPr lang="en-US" dirty="0"/>
+          </a:p>
+        </p:txBody>
+      </p:sp>
+    </p:spTree>
+    <p:extLst>
+      <p:ext uri="{BB962C8B-B14F-4D97-AF65-F5344CB8AC3E}">
+        <p14:creationId xmlns:p14="http://schemas.microsoft.com/office/powerpoint/2010/main" val="1046719060"/>
+      </p:ext>
+    </p:extLst>
+  </p:cSld>
+  <p:clrMapOvr>
+    <a:masterClrMapping/>
+  </p:clrMapOvr>
+</p:sld>
+</file>
+
+<file path=ppt/slides/slide15.xml><?xml version="1.0" encoding="utf-8"?>
+<p:sld xmlns:a="http://schemas.openxmlformats.org/drawingml/2006/main" xmlns:r="http://schemas.openxmlformats.org/officeDocument/2006/relationships" xmlns:p="http://schemas.openxmlformats.org/presentationml/2006/main">
+  <p:cSld>
+    <p:spTree>
+      <p:nvGrpSpPr>
+        <p:cNvPr id="1" name=""/>
+        <p:cNvGrpSpPr/>
+        <p:nvPr/>
+      </p:nvGrpSpPr>
+      <p:grpSpPr>
+        <a:xfrm>
+          <a:off x="0" y="0"/>
+          <a:ext cx="0" cy="0"/>
+          <a:chOff x="0" y="0"/>
+          <a:chExt cx="0" cy="0"/>
+        </a:xfrm>
+      </p:grpSpPr>
+      <p:sp>
+        <p:nvSpPr>
+          <p:cNvPr id="2" name="Title 1"/>
+          <p:cNvSpPr>
+            <a:spLocks noGrp="1"/>
+          </p:cNvSpPr>
+          <p:nvPr>
+            <p:ph type="title"/>
+          </p:nvPr>
+        </p:nvSpPr>
+        <p:spPr/>
+        <p:txBody>
+          <a:bodyPr/>
+          <a:lstStyle/>
+          <a:p>
+            <a:r>
+              <a:rPr lang="en-US" dirty="0" smtClean="0"/>
+              <a:t>BFS</a:t>
+            </a:r>
+            <a:endParaRPr lang="en-US" dirty="0"/>
+          </a:p>
+        </p:txBody>
+      </p:sp>
+      <p:sp>
+        <p:nvSpPr>
+          <p:cNvPr id="4" name="Content Placeholder 3"/>
+          <p:cNvSpPr>
+            <a:spLocks noGrp="1"/>
+          </p:cNvSpPr>
+          <p:nvPr>
+            <p:ph sz="half" idx="2"/>
+          </p:nvPr>
+        </p:nvSpPr>
+        <p:spPr>
+          <a:xfrm>
+            <a:off x="352697" y="1600201"/>
+            <a:ext cx="11229703" cy="4525963"/>
+          </a:xfrm>
+        </p:spPr>
+        <p:txBody>
+          <a:bodyPr>
+            <a:normAutofit/>
+          </a:bodyPr>
+          <a:lstStyle/>
+          <a:p>
+            <a:pPr algn="r" rtl="1"/>
+            <a:r>
+              <a:rPr lang="fa-IR" sz="2800" dirty="0"/>
+              <a:t>در الگوریتم </a:t>
+            </a:r>
+            <a:r>
+              <a:rPr lang="en-US" sz="2800" dirty="0"/>
+              <a:t>BFS</a:t>
+            </a:r>
+            <a:r>
+              <a:rPr lang="fa-IR" sz="2800" dirty="0"/>
+              <a:t> همانطور که بیشتر استفاده می­شود از </a:t>
+            </a:r>
+            <a:r>
+              <a:rPr lang="en-US" sz="2800" dirty="0"/>
+              <a:t>queue</a:t>
+            </a:r>
+            <a:r>
+              <a:rPr lang="fa-IR" sz="2800" dirty="0"/>
+              <a:t> استفاده شده که هر سلول را در خود ذخیره می­کند بعد سلول­های قابل دستیابی آن را پیدا کرده و در </a:t>
+            </a:r>
+            <a:r>
+              <a:rPr lang="en-US" sz="2800" dirty="0"/>
+              <a:t>queue</a:t>
+            </a:r>
+            <a:r>
+              <a:rPr lang="fa-IR" sz="2800" dirty="0"/>
+              <a:t> ذخیره می­کند ولی سلول اولیه </a:t>
+            </a:r>
+            <a:r>
+              <a:rPr lang="fa-IR" sz="2800" dirty="0" smtClean="0"/>
+              <a:t>ر</a:t>
+            </a:r>
+            <a:r>
+              <a:rPr lang="fa-IR" sz="2800" dirty="0"/>
+              <a:t>ا</a:t>
+            </a:r>
+            <a:r>
+              <a:rPr lang="fa-IR" sz="2800" dirty="0" smtClean="0"/>
+              <a:t> </a:t>
+            </a:r>
+            <a:r>
+              <a:rPr lang="fa-IR" sz="2800" dirty="0"/>
+              <a:t>پاک می­کند و در حلقه </a:t>
+            </a:r>
+            <a:r>
+              <a:rPr lang="en-US" sz="2800" dirty="0"/>
+              <a:t>for</a:t>
+            </a:r>
+            <a:r>
+              <a:rPr lang="fa-IR" sz="2800" dirty="0"/>
+              <a:t> به ترتیب برای تمام سلول­های ذخیره شده در </a:t>
+            </a:r>
+            <a:r>
+              <a:rPr lang="en-US" sz="2800" dirty="0"/>
+              <a:t>queue</a:t>
+            </a:r>
+            <a:r>
+              <a:rPr lang="fa-IR" sz="2800" dirty="0"/>
+              <a:t> اینکار را تکرار می­کند. برای مسیرهایی که می­تواند برود هم در حلقه </a:t>
+            </a:r>
+            <a:r>
+              <a:rPr lang="en-US" sz="2800" dirty="0"/>
+              <a:t>for</a:t>
+            </a:r>
+            <a:r>
+              <a:rPr lang="fa-IR" sz="2800" dirty="0"/>
+              <a:t> دو حالت در نظر گرفته شده اگر یک مسیر داشت مانند الگوریتم­های بالا عمل کند ولی اگر بیش از دو مسیر داشت ابتدا به یک مسیر می­رود آن را در </a:t>
+            </a:r>
+            <a:r>
+              <a:rPr lang="en-US" sz="2800" dirty="0"/>
+              <a:t>queue</a:t>
+            </a:r>
+            <a:r>
+              <a:rPr lang="fa-IR" sz="2800" dirty="0"/>
+              <a:t> و </a:t>
+            </a:r>
+            <a:r>
+              <a:rPr lang="en-US" sz="2800" dirty="0"/>
+              <a:t>trail</a:t>
+            </a:r>
+            <a:r>
+              <a:rPr lang="fa-IR" sz="2800" dirty="0"/>
+              <a:t>(آنکه مسیر کلی را ذخیره می­کند) دخیره کرد و بعد دوباره به سلول بعد باز می­گردد و از آن سلول مسیرهای دیگر را هم به همین ترتیب چک می­کند.</a:t>
+            </a:r>
+            <a:endParaRPr lang="en-US" sz="2800" dirty="0"/>
+          </a:p>
+          <a:p>
+            <a:endParaRPr lang="en-US" dirty="0"/>
+          </a:p>
+        </p:txBody>
+      </p:sp>
+    </p:spTree>
+    <p:extLst>
+      <p:ext uri="{BB962C8B-B14F-4D97-AF65-F5344CB8AC3E}">
+        <p14:creationId xmlns:p14="http://schemas.microsoft.com/office/powerpoint/2010/main" val="715803857"/>
+      </p:ext>
+    </p:extLst>
+  </p:cSld>
+  <p:clrMapOvr>
+    <a:masterClrMapping/>
+  </p:clrMapOvr>
+</p:sld>
+</file>
+
+<file path=ppt/slides/slide16.xml><?xml version="1.0" encoding="utf-8"?>
+<p:sld xmlns:a="http://schemas.openxmlformats.org/drawingml/2006/main" xmlns:r="http://schemas.openxmlformats.org/officeDocument/2006/relationships" xmlns:p="http://schemas.openxmlformats.org/presentationml/2006/main">
+  <p:cSld>
+    <p:spTree>
+      <p:nvGrpSpPr>
+        <p:cNvPr id="1" name=""/>
+        <p:cNvGrpSpPr/>
+        <p:nvPr/>
+      </p:nvGrpSpPr>
+      <p:grpSpPr>
+        <a:xfrm>
+          <a:off x="0" y="0"/>
+          <a:ext cx="0" cy="0"/>
+          <a:chOff x="0" y="0"/>
+          <a:chExt cx="0" cy="0"/>
+        </a:xfrm>
+      </p:grpSpPr>
+      <p:sp>
+        <p:nvSpPr>
+          <p:cNvPr id="2" name="Title 1"/>
+          <p:cNvSpPr>
+            <a:spLocks noGrp="1"/>
+          </p:cNvSpPr>
+          <p:nvPr>
+            <p:ph type="title"/>
+          </p:nvPr>
+        </p:nvSpPr>
+        <p:spPr/>
+        <p:txBody>
+          <a:bodyPr/>
+          <a:lstStyle/>
+          <a:p>
+            <a:pPr rtl="1"/>
+            <a:r>
+              <a:rPr lang="fa-IR" dirty="0" smtClean="0"/>
+              <a:t>ادامه </a:t>
+            </a:r>
+            <a:r>
+              <a:rPr lang="en-US" dirty="0" smtClean="0"/>
+              <a:t>BFS</a:t>
+            </a:r>
+            <a:endParaRPr lang="en-US" dirty="0"/>
+          </a:p>
+        </p:txBody>
+      </p:sp>
+      <p:sp>
+        <p:nvSpPr>
+          <p:cNvPr id="3" name="Content Placeholder 2"/>
+          <p:cNvSpPr>
+            <a:spLocks noGrp="1"/>
+          </p:cNvSpPr>
+          <p:nvPr>
+            <p:ph sz="half" idx="1"/>
+          </p:nvPr>
+        </p:nvSpPr>
+        <p:spPr/>
+        <p:txBody>
+          <a:bodyPr>
+            <a:normAutofit/>
+          </a:bodyPr>
+          <a:lstStyle/>
+          <a:p>
+            <a:pPr marL="0" indent="0">
+              <a:buNone/>
+            </a:pPr>
+            <a:r>
+              <a:rPr lang="en-US" sz="2000" dirty="0">
+                <a:solidFill>
+                  <a:srgbClr val="00B050"/>
+                </a:solidFill>
+              </a:rPr>
+              <a:t>         </a:t>
+            </a:r>
+            <a:r>
+              <a:rPr lang="en-US" sz="2000" dirty="0" smtClean="0">
+                <a:solidFill>
+                  <a:srgbClr val="00B050"/>
+                </a:solidFill>
+              </a:rPr>
+              <a:t>1-</a:t>
+            </a:r>
+            <a:r>
+              <a:rPr lang="en-US" sz="2000" dirty="0">
+                <a:solidFill>
+                  <a:srgbClr val="00B050"/>
+                </a:solidFill>
+              </a:rPr>
+              <a:t>   for(</a:t>
+            </a:r>
+            <a:r>
+              <a:rPr lang="en-US" sz="2000" u="sng" dirty="0" err="1">
+                <a:solidFill>
+                  <a:srgbClr val="00B050"/>
+                </a:solidFill>
+              </a:rPr>
+              <a:t>size_t</a:t>
+            </a:r>
+            <a:r>
+              <a:rPr lang="en-US" sz="2000" dirty="0">
+                <a:solidFill>
+                  <a:srgbClr val="00B050"/>
+                </a:solidFill>
+              </a:rPr>
+              <a:t> j = 0; j &lt; </a:t>
+            </a:r>
+            <a:r>
+              <a:rPr lang="en-US" sz="2000" dirty="0" err="1">
+                <a:solidFill>
+                  <a:srgbClr val="00B050"/>
+                </a:solidFill>
+              </a:rPr>
+              <a:t>queue.size</a:t>
+            </a:r>
+            <a:r>
+              <a:rPr lang="en-US" sz="2000" dirty="0">
+                <a:solidFill>
+                  <a:srgbClr val="00B050"/>
+                </a:solidFill>
+              </a:rPr>
+              <a:t>(); </a:t>
+            </a:r>
+            <a:r>
+              <a:rPr lang="en-US" sz="2000" dirty="0" err="1">
+                <a:solidFill>
+                  <a:srgbClr val="00B050"/>
+                </a:solidFill>
+              </a:rPr>
+              <a:t>j++</a:t>
+            </a:r>
+            <a:r>
+              <a:rPr lang="en-US" sz="2000" dirty="0">
+                <a:solidFill>
+                  <a:srgbClr val="00B050"/>
+                </a:solidFill>
+              </a:rPr>
+              <a:t>){</a:t>
+            </a:r>
+          </a:p>
+          <a:p>
+            <a:pPr marL="0" indent="0">
+              <a:buNone/>
+            </a:pPr>
+            <a:r>
+              <a:rPr lang="en-US" sz="2000" dirty="0">
+                <a:solidFill>
+                  <a:srgbClr val="00B050"/>
+                </a:solidFill>
+              </a:rPr>
+              <a:t>                curX1 = </a:t>
+            </a:r>
+            <a:r>
+              <a:rPr lang="en-US" sz="2000" dirty="0" err="1">
+                <a:solidFill>
+                  <a:srgbClr val="00B050"/>
+                </a:solidFill>
+              </a:rPr>
+              <a:t>queue.front</a:t>
+            </a:r>
+            <a:r>
+              <a:rPr lang="en-US" sz="2000" dirty="0">
+                <a:solidFill>
+                  <a:srgbClr val="00B050"/>
+                </a:solidFill>
+              </a:rPr>
+              <a:t>().</a:t>
+            </a:r>
+            <a:r>
+              <a:rPr lang="en-US" sz="2000" dirty="0" err="1">
+                <a:solidFill>
+                  <a:srgbClr val="00B050"/>
+                </a:solidFill>
+              </a:rPr>
+              <a:t>getRow</a:t>
+            </a:r>
+            <a:r>
+              <a:rPr lang="en-US" sz="2000" dirty="0">
+                <a:solidFill>
+                  <a:srgbClr val="00B050"/>
+                </a:solidFill>
+              </a:rPr>
+              <a:t>();</a:t>
+            </a:r>
+          </a:p>
+          <a:p>
+            <a:pPr marL="0" indent="0">
+              <a:buNone/>
+            </a:pPr>
+            <a:r>
+              <a:rPr lang="en-US" sz="2000" dirty="0">
+                <a:solidFill>
+                  <a:srgbClr val="00B050"/>
+                </a:solidFill>
+              </a:rPr>
+              <a:t>                curY1 = </a:t>
+            </a:r>
+            <a:r>
+              <a:rPr lang="en-US" sz="2000" dirty="0" err="1">
+                <a:solidFill>
+                  <a:srgbClr val="00B050"/>
+                </a:solidFill>
+              </a:rPr>
+              <a:t>queue.front</a:t>
+            </a:r>
+            <a:r>
+              <a:rPr lang="en-US" sz="2000" dirty="0">
+                <a:solidFill>
+                  <a:srgbClr val="00B050"/>
+                </a:solidFill>
+              </a:rPr>
+              <a:t>().</a:t>
+            </a:r>
+            <a:r>
+              <a:rPr lang="en-US" sz="2000" dirty="0" err="1">
+                <a:solidFill>
+                  <a:srgbClr val="00B050"/>
+                </a:solidFill>
+              </a:rPr>
+              <a:t>getColumn</a:t>
+            </a:r>
+            <a:r>
+              <a:rPr lang="en-US" sz="2000" dirty="0" smtClean="0">
+                <a:solidFill>
+                  <a:srgbClr val="00B050"/>
+                </a:solidFill>
+              </a:rPr>
+              <a:t>();</a:t>
+            </a:r>
+            <a:endParaRPr lang="fa-IR" sz="2000" dirty="0" smtClean="0">
+              <a:solidFill>
+                <a:srgbClr val="00B050"/>
+              </a:solidFill>
+            </a:endParaRPr>
+          </a:p>
+          <a:p>
+            <a:pPr marL="0" indent="0" algn="r" rtl="1">
+              <a:buNone/>
+            </a:pPr>
+            <a:r>
+              <a:rPr lang="en-US" sz="2000" dirty="0">
+                <a:solidFill>
+                  <a:srgbClr val="00B050"/>
+                </a:solidFill>
+              </a:rPr>
+              <a:t> </a:t>
+            </a:r>
+            <a:r>
+              <a:rPr lang="en-US" sz="2000" dirty="0" smtClean="0">
+                <a:solidFill>
+                  <a:srgbClr val="00B050"/>
+                </a:solidFill>
+              </a:rPr>
+              <a:t>        </a:t>
+            </a:r>
+            <a:endParaRPr lang="fa-IR" sz="2000" dirty="0">
+              <a:solidFill>
+                <a:srgbClr val="00B050"/>
+              </a:solidFill>
+            </a:endParaRPr>
+          </a:p>
+          <a:p>
+            <a:pPr marL="0" indent="0">
+              <a:buNone/>
+            </a:pPr>
+            <a:r>
+              <a:rPr lang="fa-IR" sz="1700" dirty="0" smtClean="0">
+                <a:solidFill>
+                  <a:srgbClr val="00B050"/>
+                </a:solidFill>
+              </a:rPr>
+              <a:t>حالت دوم</a:t>
+            </a:r>
+            <a:r>
+              <a:rPr lang="en-US" sz="1700" dirty="0">
+                <a:solidFill>
+                  <a:srgbClr val="00B050"/>
+                </a:solidFill>
+              </a:rPr>
+              <a:t>  </a:t>
+            </a:r>
+            <a:r>
+              <a:rPr lang="fa-IR" sz="1700" dirty="0" smtClean="0">
+                <a:solidFill>
+                  <a:srgbClr val="00B050"/>
+                </a:solidFill>
+              </a:rPr>
+              <a:t>  </a:t>
+            </a:r>
+            <a:r>
+              <a:rPr lang="en-US" sz="1700" dirty="0" smtClean="0">
+                <a:solidFill>
+                  <a:srgbClr val="00B050"/>
+                </a:solidFill>
+              </a:rPr>
+              <a:t>else</a:t>
+            </a:r>
+            <a:r>
+              <a:rPr lang="en-US" sz="1700" dirty="0">
+                <a:solidFill>
+                  <a:srgbClr val="00B050"/>
+                </a:solidFill>
+              </a:rPr>
+              <a:t> if(live1.size() &gt; 1){</a:t>
+            </a:r>
+          </a:p>
+          <a:p>
+            <a:pPr marL="0" indent="0">
+              <a:buNone/>
+            </a:pPr>
+            <a:r>
+              <a:rPr lang="en-US" sz="1700" dirty="0">
+                <a:solidFill>
+                  <a:srgbClr val="00B050"/>
+                </a:solidFill>
+              </a:rPr>
+              <a:t>                        switch(live1[</a:t>
+            </a:r>
+            <a:r>
+              <a:rPr lang="en-US" sz="1700" dirty="0" err="1">
+                <a:solidFill>
+                  <a:srgbClr val="00B050"/>
+                </a:solidFill>
+              </a:rPr>
+              <a:t>i</a:t>
+            </a:r>
+            <a:r>
+              <a:rPr lang="en-US" sz="1700" dirty="0">
+                <a:solidFill>
+                  <a:srgbClr val="00B050"/>
+                </a:solidFill>
+              </a:rPr>
+              <a:t>]){</a:t>
+            </a:r>
+          </a:p>
+          <a:p>
+            <a:pPr marL="0" indent="0">
+              <a:buNone/>
+            </a:pPr>
+            <a:r>
+              <a:rPr lang="en-US" sz="1700" dirty="0">
+                <a:solidFill>
+                  <a:srgbClr val="00B050"/>
+                </a:solidFill>
+              </a:rPr>
+              <a:t>                            case 0: //NORTH</a:t>
+            </a:r>
+          </a:p>
+          <a:p>
+            <a:pPr marL="0" indent="0">
+              <a:buNone/>
+            </a:pPr>
+            <a:r>
+              <a:rPr lang="en-US" sz="1700" dirty="0">
+                <a:solidFill>
+                  <a:srgbClr val="00B050"/>
+                </a:solidFill>
+              </a:rPr>
+              <a:t>                                maze[--curX1][curY1].</a:t>
+            </a:r>
+            <a:r>
+              <a:rPr lang="en-US" sz="1700" dirty="0" err="1">
+                <a:solidFill>
+                  <a:srgbClr val="00B050"/>
+                </a:solidFill>
+              </a:rPr>
+              <a:t>setVisited</a:t>
+            </a:r>
+            <a:r>
+              <a:rPr lang="en-US" sz="1700" dirty="0">
+                <a:solidFill>
+                  <a:srgbClr val="00B050"/>
+                </a:solidFill>
+              </a:rPr>
+              <a:t>(true);</a:t>
+            </a:r>
+          </a:p>
+          <a:p>
+            <a:pPr marL="0" indent="0">
+              <a:buNone/>
+            </a:pPr>
+            <a:r>
+              <a:rPr lang="en-US" sz="1700" dirty="0">
+                <a:solidFill>
+                  <a:srgbClr val="00B050"/>
+                </a:solidFill>
+              </a:rPr>
+              <a:t>                                trail1.push_back(maze[curX1][curY1]);</a:t>
+            </a:r>
+          </a:p>
+          <a:p>
+            <a:pPr marL="0" indent="0">
+              <a:buNone/>
+            </a:pPr>
+            <a:r>
+              <a:rPr lang="en-US" sz="1700" dirty="0">
+                <a:solidFill>
+                  <a:srgbClr val="00B050"/>
+                </a:solidFill>
+              </a:rPr>
+              <a:t>                                </a:t>
+            </a:r>
+            <a:r>
+              <a:rPr lang="en-US" sz="1700" dirty="0" err="1">
+                <a:solidFill>
+                  <a:srgbClr val="00B050"/>
+                </a:solidFill>
+              </a:rPr>
+              <a:t>queue.push</a:t>
+            </a:r>
+            <a:r>
+              <a:rPr lang="en-US" sz="1700" dirty="0">
+                <a:solidFill>
+                  <a:srgbClr val="00B050"/>
+                </a:solidFill>
+              </a:rPr>
+              <a:t>(maze[curX1][curY1]);</a:t>
+            </a:r>
+          </a:p>
+          <a:p>
+            <a:pPr marL="0" indent="0">
+              <a:buNone/>
+            </a:pPr>
+            <a:r>
+              <a:rPr lang="en-US" sz="1700" dirty="0">
+                <a:solidFill>
+                  <a:srgbClr val="00B050"/>
+                </a:solidFill>
+              </a:rPr>
+              <a:t>                                curX1++;</a:t>
+            </a:r>
+          </a:p>
+          <a:p>
+            <a:pPr marL="0" indent="0">
+              <a:buNone/>
+            </a:pPr>
+            <a:r>
+              <a:rPr lang="en-US" sz="1700" dirty="0">
+                <a:solidFill>
+                  <a:srgbClr val="00B050"/>
+                </a:solidFill>
+              </a:rPr>
+              <a:t>                                break;</a:t>
+            </a:r>
+          </a:p>
+          <a:p>
+            <a:pPr marL="0" indent="0">
+              <a:buNone/>
+            </a:pPr>
+            <a:endParaRPr lang="en-US" sz="2000" dirty="0">
+              <a:solidFill>
+                <a:srgbClr val="00B050"/>
+              </a:solidFill>
+            </a:endParaRPr>
+          </a:p>
+          <a:p>
+            <a:endParaRPr lang="en-US" dirty="0"/>
+          </a:p>
+        </p:txBody>
+      </p:sp>
+      <p:sp>
+        <p:nvSpPr>
+          <p:cNvPr id="4" name="Content Placeholder 3"/>
+          <p:cNvSpPr>
+            <a:spLocks noGrp="1"/>
+          </p:cNvSpPr>
+          <p:nvPr>
+            <p:ph sz="half" idx="2"/>
+          </p:nvPr>
+        </p:nvSpPr>
+        <p:spPr>
+          <a:xfrm>
+            <a:off x="6197600" y="1600200"/>
+            <a:ext cx="5384800" cy="4525963"/>
+          </a:xfrm>
+        </p:spPr>
+        <p:txBody>
+          <a:bodyPr>
+            <a:normAutofit/>
+          </a:bodyPr>
+          <a:lstStyle/>
+          <a:p>
+            <a:pPr marL="0" indent="0" algn="r" rtl="1">
+              <a:buNone/>
+            </a:pPr>
+            <a:r>
+              <a:rPr lang="fa-IR" sz="2800" dirty="0" smtClean="0"/>
+              <a:t>2-</a:t>
+            </a:r>
+            <a:r>
+              <a:rPr lang="en-US" sz="2800" dirty="0" smtClean="0"/>
+              <a:t> </a:t>
+            </a:r>
+            <a:r>
+              <a:rPr lang="fa-IR" sz="2800" dirty="0"/>
+              <a:t>مسیرهای ممکن را برای این سلول بدست می آورد</a:t>
+            </a:r>
+            <a:r>
+              <a:rPr lang="fa-IR" sz="2800" dirty="0" smtClean="0"/>
+              <a:t>.</a:t>
+            </a:r>
+          </a:p>
+          <a:p>
+            <a:pPr marL="0" indent="0" algn="r" rtl="1">
+              <a:buNone/>
+            </a:pPr>
+            <a:r>
+              <a:rPr lang="fa-IR" sz="2800" dirty="0" smtClean="0"/>
+              <a:t>3- مسیرهای ممکن را درحلقه </a:t>
+            </a:r>
+            <a:r>
+              <a:rPr lang="en-US" sz="2800" dirty="0" smtClean="0"/>
+              <a:t>for</a:t>
+            </a:r>
+            <a:r>
+              <a:rPr lang="fa-IR" sz="2800" dirty="0" smtClean="0"/>
+              <a:t> بررسی میکند.(در دو حالت)</a:t>
+            </a:r>
+          </a:p>
+          <a:p>
+            <a:pPr marL="0" indent="0" algn="r" rtl="1">
+              <a:buNone/>
+            </a:pPr>
+            <a:r>
+              <a:rPr lang="fa-IR" sz="2800" dirty="0" smtClean="0"/>
+              <a:t>4- بعد از بیرو آمدن از حلقه (1) اولین المان را </a:t>
+            </a:r>
+            <a:r>
+              <a:rPr lang="en-US" sz="2800" dirty="0" smtClean="0"/>
+              <a:t>pop</a:t>
+            </a:r>
+            <a:r>
+              <a:rPr lang="fa-IR" sz="2800" dirty="0" smtClean="0"/>
+              <a:t> میکند.</a:t>
+            </a:r>
+          </a:p>
+          <a:p>
+            <a:pPr marL="0" indent="0" algn="l">
+              <a:buNone/>
+            </a:pPr>
+            <a:r>
+              <a:rPr lang="en-US" sz="2800" dirty="0" err="1">
+                <a:solidFill>
+                  <a:srgbClr val="00B050"/>
+                </a:solidFill>
+              </a:rPr>
+              <a:t>queue.pop</a:t>
+            </a:r>
+            <a:r>
+              <a:rPr lang="en-US" sz="2800" dirty="0">
+                <a:solidFill>
+                  <a:srgbClr val="00B050"/>
+                </a:solidFill>
+              </a:rPr>
+              <a:t>();</a:t>
+            </a:r>
+          </a:p>
+          <a:p>
+            <a:pPr marL="0" indent="0" algn="r" rtl="1">
+              <a:buNone/>
+            </a:pPr>
+            <a:endParaRPr lang="en-US" dirty="0"/>
+          </a:p>
+        </p:txBody>
+      </p:sp>
+    </p:spTree>
+    <p:extLst>
+      <p:ext uri="{BB962C8B-B14F-4D97-AF65-F5344CB8AC3E}">
+        <p14:creationId xmlns:p14="http://schemas.microsoft.com/office/powerpoint/2010/main" val="42280330"/>
+      </p:ext>
+    </p:extLst>
+  </p:cSld>
+  <p:clrMapOvr>
+    <a:masterClrMapping/>
+  </p:clrMapOvr>
+</p:sld>
+</file>
+
+<file path=ppt/slides/slide17.xml><?xml version="1.0" encoding="utf-8"?>
+<p:sld xmlns:a="http://schemas.openxmlformats.org/drawingml/2006/main" xmlns:r="http://schemas.openxmlformats.org/officeDocument/2006/relationships" xmlns:p="http://schemas.openxmlformats.org/presentationml/2006/main">
+  <p:cSld>
+    <p:spTree>
+      <p:nvGrpSpPr>
+        <p:cNvPr id="1" name=""/>
+        <p:cNvGrpSpPr/>
+        <p:nvPr/>
+      </p:nvGrpSpPr>
+      <p:grpSpPr>
+        <a:xfrm>
+          <a:off x="0" y="0"/>
+          <a:ext cx="0" cy="0"/>
+          <a:chOff x="0" y="0"/>
+          <a:chExt cx="0" cy="0"/>
+        </a:xfrm>
+      </p:grpSpPr>
+      <p:sp>
+        <p:nvSpPr>
           <p:cNvPr id="3" name="Content Placeholder 2"/>
           <p:cNvSpPr>
             <a:spLocks noGrp="1"/>
@@ -6772,7 +8095,7 @@
 </p:sld>
 </file>
 
-<file path=ppt/slides/slide15.xml><?xml version="1.0" encoding="utf-8"?>
+<file path=ppt/slides/slide18.xml><?xml version="1.0" encoding="utf-8"?>
 <p:sld xmlns:a="http://schemas.openxmlformats.org/drawingml/2006/main" xmlns:r="http://schemas.openxmlformats.org/officeDocument/2006/relationships" xmlns:p="http://schemas.openxmlformats.org/presentationml/2006/main">
   <p:cSld>
     <p:spTree>
@@ -6791,13 +8114,11 @@
       </p:grpSpPr>
       <p:pic>
         <p:nvPicPr>
-          <p:cNvPr id="4" name="Content Placeholder 3"/>
+          <p:cNvPr id="3" name="Picture 2"/>
           <p:cNvPicPr>
-            <a:picLocks noGrp="1" noChangeAspect="1"/>
+            <a:picLocks noChangeAspect="1"/>
           </p:cNvPicPr>
-          <p:nvPr>
-            <p:ph idx="1"/>
-          </p:nvPr>
+          <p:nvPr/>
         </p:nvPicPr>
         <p:blipFill>
           <a:blip r:embed="rId2"/>
@@ -6807,8 +8128,32 @@
         </p:blipFill>
         <p:spPr>
           <a:xfrm>
-            <a:off x="2194560" y="169817"/>
-            <a:ext cx="7759337" cy="6335486"/>
+            <a:off x="352696" y="365759"/>
+            <a:ext cx="5394959" cy="6244046"/>
+          </a:xfrm>
+          <a:prstGeom prst="rect">
+            <a:avLst/>
+          </a:prstGeom>
+        </p:spPr>
+      </p:pic>
+      <p:pic>
+        <p:nvPicPr>
+          <p:cNvPr id="5" name="Picture 4"/>
+          <p:cNvPicPr>
+            <a:picLocks noChangeAspect="1"/>
+          </p:cNvPicPr>
+          <p:nvPr/>
+        </p:nvPicPr>
+        <p:blipFill>
+          <a:blip r:embed="rId3"/>
+          <a:stretch>
+            <a:fillRect/>
+          </a:stretch>
+        </p:blipFill>
+        <p:spPr>
+          <a:xfrm>
+            <a:off x="5747655" y="365759"/>
+            <a:ext cx="5721534" cy="6244046"/>
           </a:xfrm>
           <a:prstGeom prst="rect">
             <a:avLst/>
@@ -6835,7 +8180,7 @@
 </p:sld>
 </file>
 
-<file path=ppt/slides/slide16.xml><?xml version="1.0" encoding="utf-8"?>
+<file path=ppt/slides/slide19.xml><?xml version="1.0" encoding="utf-8"?>
 <p:sld xmlns:a="http://schemas.openxmlformats.org/drawingml/2006/main" xmlns:r="http://schemas.openxmlformats.org/officeDocument/2006/relationships" xmlns:p="http://schemas.openxmlformats.org/presentationml/2006/main">
   <p:cSld>
     <p:spTree>
@@ -8292,8 +9637,8 @@
           </a:p>
         </p:txBody>
       </p:sp>
-      <mc:AlternateContent xmlns:mc="http://schemas.openxmlformats.org/markup-compatibility/2006">
-        <mc:Choice xmlns:p14="http://schemas.microsoft.com/office/powerpoint/2010/main" Requires="p14">
+      <mc:AlternateContent xmlns:mc="http://schemas.openxmlformats.org/markup-compatibility/2006" xmlns:p14="http://schemas.microsoft.com/office/powerpoint/2010/main">
+        <mc:Choice Requires="p14">
           <p:contentPart p14:bwMode="auto" r:id="rId2">
             <p14:nvContentPartPr>
               <p14:cNvPr id="52" name="Ink 51"/>
@@ -8306,7 +9651,7 @@
             </p14:xfrm>
           </p:contentPart>
         </mc:Choice>
-        <mc:Fallback>
+        <mc:Fallback xmlns="">
           <p:pic>
             <p:nvPicPr>
               <p:cNvPr id="52" name="Ink 51"/>
@@ -8331,8 +9676,8 @@
           </p:pic>
         </mc:Fallback>
       </mc:AlternateContent>
-      <mc:AlternateContent xmlns:mc="http://schemas.openxmlformats.org/markup-compatibility/2006">
-        <mc:Choice xmlns:p14="http://schemas.microsoft.com/office/powerpoint/2010/main" Requires="p14">
+      <mc:AlternateContent xmlns:mc="http://schemas.openxmlformats.org/markup-compatibility/2006" xmlns:p14="http://schemas.microsoft.com/office/powerpoint/2010/main">
+        <mc:Choice Requires="p14">
           <p:contentPart p14:bwMode="auto" r:id="rId4">
             <p14:nvContentPartPr>
               <p14:cNvPr id="61" name="Ink 60"/>
@@ -8345,7 +9690,7 @@
             </p14:xfrm>
           </p:contentPart>
         </mc:Choice>
-        <mc:Fallback>
+        <mc:Fallback xmlns="">
           <p:pic>
             <p:nvPicPr>
               <p:cNvPr id="61" name="Ink 60"/>
@@ -8370,8 +9715,8 @@
           </p:pic>
         </mc:Fallback>
       </mc:AlternateContent>
-      <mc:AlternateContent xmlns:mc="http://schemas.openxmlformats.org/markup-compatibility/2006">
-        <mc:Choice xmlns:p14="http://schemas.microsoft.com/office/powerpoint/2010/main" Requires="p14">
+      <mc:AlternateContent xmlns:mc="http://schemas.openxmlformats.org/markup-compatibility/2006" xmlns:p14="http://schemas.microsoft.com/office/powerpoint/2010/main">
+        <mc:Choice Requires="p14">
           <p:contentPart p14:bwMode="auto" r:id="rId6">
             <p14:nvContentPartPr>
               <p14:cNvPr id="65" name="Ink 64"/>
@@ -8384,7 +9729,7 @@
             </p14:xfrm>
           </p:contentPart>
         </mc:Choice>
-        <mc:Fallback>
+        <mc:Fallback xmlns="">
           <p:pic>
             <p:nvPicPr>
               <p:cNvPr id="65" name="Ink 64"/>
@@ -8409,8 +9754,8 @@
           </p:pic>
         </mc:Fallback>
       </mc:AlternateContent>
-      <mc:AlternateContent xmlns:mc="http://schemas.openxmlformats.org/markup-compatibility/2006">
-        <mc:Choice xmlns:p14="http://schemas.microsoft.com/office/powerpoint/2010/main" Requires="p14">
+      <mc:AlternateContent xmlns:mc="http://schemas.openxmlformats.org/markup-compatibility/2006" xmlns:p14="http://schemas.microsoft.com/office/powerpoint/2010/main">
+        <mc:Choice Requires="p14">
           <p:contentPart p14:bwMode="auto" r:id="rId8">
             <p14:nvContentPartPr>
               <p14:cNvPr id="79" name="Ink 78"/>
@@ -8423,7 +9768,7 @@
             </p14:xfrm>
           </p:contentPart>
         </mc:Choice>
-        <mc:Fallback>
+        <mc:Fallback xmlns="">
           <p:pic>
             <p:nvPicPr>
               <p:cNvPr id="79" name="Ink 78"/>
@@ -8448,8 +9793,8 @@
           </p:pic>
         </mc:Fallback>
       </mc:AlternateContent>
-      <mc:AlternateContent xmlns:mc="http://schemas.openxmlformats.org/markup-compatibility/2006">
-        <mc:Choice xmlns:p14="http://schemas.microsoft.com/office/powerpoint/2010/main" Requires="p14">
+      <mc:AlternateContent xmlns:mc="http://schemas.openxmlformats.org/markup-compatibility/2006" xmlns:p14="http://schemas.microsoft.com/office/powerpoint/2010/main">
+        <mc:Choice Requires="p14">
           <p:contentPart p14:bwMode="auto" r:id="rId10">
             <p14:nvContentPartPr>
               <p14:cNvPr id="80" name="Ink 79"/>
@@ -8462,7 +9807,7 @@
             </p14:xfrm>
           </p:contentPart>
         </mc:Choice>
-        <mc:Fallback>
+        <mc:Fallback xmlns="">
           <p:pic>
             <p:nvPicPr>
               <p:cNvPr id="80" name="Ink 79"/>
@@ -8487,8 +9832,8 @@
           </p:pic>
         </mc:Fallback>
       </mc:AlternateContent>
-      <mc:AlternateContent xmlns:mc="http://schemas.openxmlformats.org/markup-compatibility/2006">
-        <mc:Choice xmlns:p14="http://schemas.microsoft.com/office/powerpoint/2010/main" Requires="p14">
+      <mc:AlternateContent xmlns:mc="http://schemas.openxmlformats.org/markup-compatibility/2006" xmlns:p14="http://schemas.microsoft.com/office/powerpoint/2010/main">
+        <mc:Choice Requires="p14">
           <p:contentPart p14:bwMode="auto" r:id="rId12">
             <p14:nvContentPartPr>
               <p14:cNvPr id="83" name="Ink 82"/>
@@ -8501,7 +9846,7 @@
             </p14:xfrm>
           </p:contentPart>
         </mc:Choice>
-        <mc:Fallback>
+        <mc:Fallback xmlns="">
           <p:pic>
             <p:nvPicPr>
               <p:cNvPr id="83" name="Ink 82"/>
@@ -8589,8 +9934,8 @@
           </a:prstGeom>
         </p:spPr>
       </p:pic>
-      <mc:AlternateContent xmlns:mc="http://schemas.openxmlformats.org/markup-compatibility/2006">
-        <mc:Choice xmlns:p14="http://schemas.microsoft.com/office/powerpoint/2010/main" Requires="p14">
+      <mc:AlternateContent xmlns:mc="http://schemas.openxmlformats.org/markup-compatibility/2006" xmlns:p14="http://schemas.microsoft.com/office/powerpoint/2010/main">
+        <mc:Choice Requires="p14">
           <p:contentPart p14:bwMode="auto" r:id="rId3">
             <p14:nvContentPartPr>
               <p14:cNvPr id="6" name="Ink 5"/>
@@ -8603,7 +9948,7 @@
             </p14:xfrm>
           </p:contentPart>
         </mc:Choice>
-        <mc:Fallback>
+        <mc:Fallback xmlns="">
           <p:pic>
             <p:nvPicPr>
               <p:cNvPr id="6" name="Ink 5"/>
@@ -8628,8 +9973,8 @@
           </p:pic>
         </mc:Fallback>
       </mc:AlternateContent>
-      <mc:AlternateContent xmlns:mc="http://schemas.openxmlformats.org/markup-compatibility/2006">
-        <mc:Choice xmlns:p14="http://schemas.microsoft.com/office/powerpoint/2010/main" Requires="p14">
+      <mc:AlternateContent xmlns:mc="http://schemas.openxmlformats.org/markup-compatibility/2006" xmlns:p14="http://schemas.microsoft.com/office/powerpoint/2010/main">
+        <mc:Choice Requires="p14">
           <p:contentPart p14:bwMode="auto" r:id="rId5">
             <p14:nvContentPartPr>
               <p14:cNvPr id="10" name="Ink 9"/>
@@ -8642,7 +9987,7 @@
             </p14:xfrm>
           </p:contentPart>
         </mc:Choice>
-        <mc:Fallback>
+        <mc:Fallback xmlns="">
           <p:pic>
             <p:nvPicPr>
               <p:cNvPr id="10" name="Ink 9"/>
@@ -8667,8 +10012,8 @@
           </p:pic>
         </mc:Fallback>
       </mc:AlternateContent>
-      <mc:AlternateContent xmlns:mc="http://schemas.openxmlformats.org/markup-compatibility/2006">
-        <mc:Choice xmlns:p14="http://schemas.microsoft.com/office/powerpoint/2010/main" Requires="p14">
+      <mc:AlternateContent xmlns:mc="http://schemas.openxmlformats.org/markup-compatibility/2006" xmlns:p14="http://schemas.microsoft.com/office/powerpoint/2010/main">
+        <mc:Choice Requires="p14">
           <p:contentPart p14:bwMode="auto" r:id="rId7">
             <p14:nvContentPartPr>
               <p14:cNvPr id="12" name="Ink 11"/>
@@ -8681,7 +10026,7 @@
             </p14:xfrm>
           </p:contentPart>
         </mc:Choice>
-        <mc:Fallback>
+        <mc:Fallback xmlns="">
           <p:pic>
             <p:nvPicPr>
               <p:cNvPr id="12" name="Ink 11"/>
@@ -8706,8 +10051,8 @@
           </p:pic>
         </mc:Fallback>
       </mc:AlternateContent>
-      <mc:AlternateContent xmlns:mc="http://schemas.openxmlformats.org/markup-compatibility/2006">
-        <mc:Choice xmlns:p14="http://schemas.microsoft.com/office/powerpoint/2010/main" Requires="p14">
+      <mc:AlternateContent xmlns:mc="http://schemas.openxmlformats.org/markup-compatibility/2006" xmlns:p14="http://schemas.microsoft.com/office/powerpoint/2010/main">
+        <mc:Choice Requires="p14">
           <p:contentPart p14:bwMode="auto" r:id="rId9">
             <p14:nvContentPartPr>
               <p14:cNvPr id="14" name="Ink 13"/>
@@ -8720,7 +10065,7 @@
             </p14:xfrm>
           </p:contentPart>
         </mc:Choice>
-        <mc:Fallback>
+        <mc:Fallback xmlns="">
           <p:pic>
             <p:nvPicPr>
               <p:cNvPr id="14" name="Ink 13"/>
@@ -8745,8 +10090,8 @@
           </p:pic>
         </mc:Fallback>
       </mc:AlternateContent>
-      <mc:AlternateContent xmlns:mc="http://schemas.openxmlformats.org/markup-compatibility/2006">
-        <mc:Choice xmlns:p14="http://schemas.microsoft.com/office/powerpoint/2010/main" Requires="p14">
+      <mc:AlternateContent xmlns:mc="http://schemas.openxmlformats.org/markup-compatibility/2006" xmlns:p14="http://schemas.microsoft.com/office/powerpoint/2010/main">
+        <mc:Choice Requires="p14">
           <p:contentPart p14:bwMode="auto" r:id="rId11">
             <p14:nvContentPartPr>
               <p14:cNvPr id="16" name="Ink 15"/>
@@ -8759,7 +10104,7 @@
             </p14:xfrm>
           </p:contentPart>
         </mc:Choice>
-        <mc:Fallback>
+        <mc:Fallback xmlns="">
           <p:pic>
             <p:nvPicPr>
               <p:cNvPr id="16" name="Ink 15"/>
@@ -8821,25 +10166,6 @@
           <a:chExt cx="0" cy="0"/>
         </a:xfrm>
       </p:grpSpPr>
-      <p:sp>
-        <p:nvSpPr>
-          <p:cNvPr id="3" name="Content Placeholder 2"/>
-          <p:cNvSpPr>
-            <a:spLocks noGrp="1"/>
-          </p:cNvSpPr>
-          <p:nvPr>
-            <p:ph idx="1"/>
-          </p:nvPr>
-        </p:nvSpPr>
-        <p:spPr/>
-        <p:txBody>
-          <a:bodyPr/>
-          <a:lstStyle/>
-          <a:p>
-            <a:endParaRPr lang="en-US"/>
-          </a:p>
-        </p:txBody>
-      </p:sp>
       <p:pic>
         <p:nvPicPr>
           <p:cNvPr id="4" name="Picture 3"/>
@@ -8864,8 +10190,8 @@
           </a:prstGeom>
         </p:spPr>
       </p:pic>
-      <mc:AlternateContent xmlns:mc="http://schemas.openxmlformats.org/markup-compatibility/2006">
-        <mc:Choice xmlns:p14="http://schemas.microsoft.com/office/powerpoint/2010/main" Requires="p14">
+      <mc:AlternateContent xmlns:mc="http://schemas.openxmlformats.org/markup-compatibility/2006" xmlns:p14="http://schemas.microsoft.com/office/powerpoint/2010/main">
+        <mc:Choice Requires="p14">
           <p:contentPart p14:bwMode="auto" r:id="rId3">
             <p14:nvContentPartPr>
               <p14:cNvPr id="22" name="Ink 21"/>
@@ -8878,7 +10204,7 @@
             </p14:xfrm>
           </p:contentPart>
         </mc:Choice>
-        <mc:Fallback>
+        <mc:Fallback xmlns="">
           <p:pic>
             <p:nvPicPr>
               <p:cNvPr id="22" name="Ink 21"/>
@@ -8903,8 +10229,8 @@
           </p:pic>
         </mc:Fallback>
       </mc:AlternateContent>
-      <mc:AlternateContent xmlns:mc="http://schemas.openxmlformats.org/markup-compatibility/2006">
-        <mc:Choice xmlns:p14="http://schemas.microsoft.com/office/powerpoint/2010/main" Requires="p14">
+      <mc:AlternateContent xmlns:mc="http://schemas.openxmlformats.org/markup-compatibility/2006" xmlns:p14="http://schemas.microsoft.com/office/powerpoint/2010/main">
+        <mc:Choice Requires="p14">
           <p:contentPart p14:bwMode="auto" r:id="rId5">
             <p14:nvContentPartPr>
               <p14:cNvPr id="34" name="Ink 33"/>
@@ -8917,7 +10243,7 @@
             </p14:xfrm>
           </p:contentPart>
         </mc:Choice>
-        <mc:Fallback>
+        <mc:Fallback xmlns="">
           <p:pic>
             <p:nvPicPr>
               <p:cNvPr id="34" name="Ink 33"/>
@@ -8942,8 +10268,8 @@
           </p:pic>
         </mc:Fallback>
       </mc:AlternateContent>
-      <mc:AlternateContent xmlns:mc="http://schemas.openxmlformats.org/markup-compatibility/2006">
-        <mc:Choice xmlns:p14="http://schemas.microsoft.com/office/powerpoint/2010/main" Requires="p14">
+      <mc:AlternateContent xmlns:mc="http://schemas.openxmlformats.org/markup-compatibility/2006" xmlns:p14="http://schemas.microsoft.com/office/powerpoint/2010/main">
+        <mc:Choice Requires="p14">
           <p:contentPart p14:bwMode="auto" r:id="rId7">
             <p14:nvContentPartPr>
               <p14:cNvPr id="35" name="Ink 34"/>
@@ -8956,7 +10282,7 @@
             </p14:xfrm>
           </p:contentPart>
         </mc:Choice>
-        <mc:Fallback>
+        <mc:Fallback xmlns="">
           <p:pic>
             <p:nvPicPr>
               <p:cNvPr id="35" name="Ink 34"/>
@@ -8981,8 +10307,8 @@
           </p:pic>
         </mc:Fallback>
       </mc:AlternateContent>
-      <mc:AlternateContent xmlns:mc="http://schemas.openxmlformats.org/markup-compatibility/2006">
-        <mc:Choice xmlns:p14="http://schemas.microsoft.com/office/powerpoint/2010/main" Requires="p14">
+      <mc:AlternateContent xmlns:mc="http://schemas.openxmlformats.org/markup-compatibility/2006" xmlns:p14="http://schemas.microsoft.com/office/powerpoint/2010/main">
+        <mc:Choice Requires="p14">
           <p:contentPart p14:bwMode="auto" r:id="rId9">
             <p14:nvContentPartPr>
               <p14:cNvPr id="36" name="Ink 35"/>
@@ -8995,7 +10321,7 @@
             </p14:xfrm>
           </p:contentPart>
         </mc:Choice>
-        <mc:Fallback>
+        <mc:Fallback xmlns="">
           <p:pic>
             <p:nvPicPr>
               <p:cNvPr id="36" name="Ink 35"/>

</xml_diff>